<commit_message>
checkerboard: dot instead of cross
</commit_message>
<xml_diff>
--- a/Assets/Materials/CheckerboardVectorGraphic.pptx
+++ b/Assets/Materials/CheckerboardVectorGraphic.pptx
@@ -1,25 +1,121 @@
 
 <file path=ppt/presentation.xml><?xml version="1.0" encoding="utf-8"?>
-<p:presentation xmlns:a="http://schemas.openxmlformats.org/drawingml/2006/main" xmlns:p="http://schemas.openxmlformats.org/presentationml/2006/main" xmlns:r="http://schemas.openxmlformats.org/officeDocument/2006/relationships" xmlns:p14="http://schemas.microsoft.com/office/powerpoint/2010/main" xmlns:p15="http://schemas.microsoft.com/office/powerpoint/2012/main" xmlns:mc="http://schemas.openxmlformats.org/markup-compatibility/2006">
+<p:presentation xmlns:a="http://schemas.openxmlformats.org/drawingml/2006/main" xmlns:r="http://schemas.openxmlformats.org/officeDocument/2006/relationships" xmlns:p="http://schemas.openxmlformats.org/presentationml/2006/main">
   <p:sldMasterIdLst>
-    <p:sldMasterId id="2147483648" r:id="rId2"/>
+    <p:sldMasterId id="2147483648" r:id="rId1"/>
   </p:sldMasterIdLst>
   <p:sldIdLst>
-    <p:sldId id="256" r:id="rId3"/>
+    <p:sldId id="256" r:id="rId2"/>
   </p:sldIdLst>
   <p:sldSz cx="9906000" cy="9906000"/>
   <p:notesSz cx="7559675" cy="10691813"/>
+  <p:defaultTextStyle>
+    <a:defPPr>
+      <a:defRPr lang="de-DE"/>
+    </a:defPPr>
+    <a:lvl1pPr marL="0" algn="l" defTabSz="914400" rtl="0" eaLnBrk="1" latinLnBrk="0" hangingPunct="1">
+      <a:defRPr sz="1800" kern="1200">
+        <a:solidFill>
+          <a:schemeClr val="tx1"/>
+        </a:solidFill>
+        <a:latin typeface="+mn-lt"/>
+        <a:ea typeface="+mn-ea"/>
+        <a:cs typeface="+mn-cs"/>
+      </a:defRPr>
+    </a:lvl1pPr>
+    <a:lvl2pPr marL="457200" algn="l" defTabSz="914400" rtl="0" eaLnBrk="1" latinLnBrk="0" hangingPunct="1">
+      <a:defRPr sz="1800" kern="1200">
+        <a:solidFill>
+          <a:schemeClr val="tx1"/>
+        </a:solidFill>
+        <a:latin typeface="+mn-lt"/>
+        <a:ea typeface="+mn-ea"/>
+        <a:cs typeface="+mn-cs"/>
+      </a:defRPr>
+    </a:lvl2pPr>
+    <a:lvl3pPr marL="914400" algn="l" defTabSz="914400" rtl="0" eaLnBrk="1" latinLnBrk="0" hangingPunct="1">
+      <a:defRPr sz="1800" kern="1200">
+        <a:solidFill>
+          <a:schemeClr val="tx1"/>
+        </a:solidFill>
+        <a:latin typeface="+mn-lt"/>
+        <a:ea typeface="+mn-ea"/>
+        <a:cs typeface="+mn-cs"/>
+      </a:defRPr>
+    </a:lvl3pPr>
+    <a:lvl4pPr marL="1371600" algn="l" defTabSz="914400" rtl="0" eaLnBrk="1" latinLnBrk="0" hangingPunct="1">
+      <a:defRPr sz="1800" kern="1200">
+        <a:solidFill>
+          <a:schemeClr val="tx1"/>
+        </a:solidFill>
+        <a:latin typeface="+mn-lt"/>
+        <a:ea typeface="+mn-ea"/>
+        <a:cs typeface="+mn-cs"/>
+      </a:defRPr>
+    </a:lvl4pPr>
+    <a:lvl5pPr marL="1828800" algn="l" defTabSz="914400" rtl="0" eaLnBrk="1" latinLnBrk="0" hangingPunct="1">
+      <a:defRPr sz="1800" kern="1200">
+        <a:solidFill>
+          <a:schemeClr val="tx1"/>
+        </a:solidFill>
+        <a:latin typeface="+mn-lt"/>
+        <a:ea typeface="+mn-ea"/>
+        <a:cs typeface="+mn-cs"/>
+      </a:defRPr>
+    </a:lvl5pPr>
+    <a:lvl6pPr marL="2286000" algn="l" defTabSz="914400" rtl="0" eaLnBrk="1" latinLnBrk="0" hangingPunct="1">
+      <a:defRPr sz="1800" kern="1200">
+        <a:solidFill>
+          <a:schemeClr val="tx1"/>
+        </a:solidFill>
+        <a:latin typeface="+mn-lt"/>
+        <a:ea typeface="+mn-ea"/>
+        <a:cs typeface="+mn-cs"/>
+      </a:defRPr>
+    </a:lvl6pPr>
+    <a:lvl7pPr marL="2743200" algn="l" defTabSz="914400" rtl="0" eaLnBrk="1" latinLnBrk="0" hangingPunct="1">
+      <a:defRPr sz="1800" kern="1200">
+        <a:solidFill>
+          <a:schemeClr val="tx1"/>
+        </a:solidFill>
+        <a:latin typeface="+mn-lt"/>
+        <a:ea typeface="+mn-ea"/>
+        <a:cs typeface="+mn-cs"/>
+      </a:defRPr>
+    </a:lvl7pPr>
+    <a:lvl8pPr marL="3200400" algn="l" defTabSz="914400" rtl="0" eaLnBrk="1" latinLnBrk="0" hangingPunct="1">
+      <a:defRPr sz="1800" kern="1200">
+        <a:solidFill>
+          <a:schemeClr val="tx1"/>
+        </a:solidFill>
+        <a:latin typeface="+mn-lt"/>
+        <a:ea typeface="+mn-ea"/>
+        <a:cs typeface="+mn-cs"/>
+      </a:defRPr>
+    </a:lvl8pPr>
+    <a:lvl9pPr marL="3657600" algn="l" defTabSz="914400" rtl="0" eaLnBrk="1" latinLnBrk="0" hangingPunct="1">
+      <a:defRPr sz="1800" kern="1200">
+        <a:solidFill>
+          <a:schemeClr val="tx1"/>
+        </a:solidFill>
+        <a:latin typeface="+mn-lt"/>
+        <a:ea typeface="+mn-ea"/>
+        <a:cs typeface="+mn-cs"/>
+      </a:defRPr>
+    </a:lvl9pPr>
+  </p:defaultTextStyle>
 </p:presentation>
 </file>
 
 <file path=ppt/slideLayouts/slideLayout1.xml><?xml version="1.0" encoding="utf-8"?>
-<p:sldLayout xmlns:a="http://schemas.openxmlformats.org/drawingml/2006/main" xmlns:p="http://schemas.openxmlformats.org/presentationml/2006/main" xmlns:r="http://schemas.openxmlformats.org/officeDocument/2006/relationships" xmlns:p14="http://schemas.microsoft.com/office/powerpoint/2010/main" xmlns:p15="http://schemas.microsoft.com/office/powerpoint/2012/main" xmlns:mc="http://schemas.openxmlformats.org/markup-compatibility/2006" type="title" preserve="1">
+<p:sldLayout xmlns:a="http://schemas.openxmlformats.org/drawingml/2006/main" xmlns:r="http://schemas.openxmlformats.org/officeDocument/2006/relationships" xmlns:p="http://schemas.openxmlformats.org/presentationml/2006/main" type="title" preserve="1">
   <p:cSld name="Titelfolie">
     <p:bg>
       <p:bgPr>
         <a:solidFill>
-          <a:srgbClr val="ffffff"/>
+          <a:srgbClr val="FFFFFF"/>
         </a:solidFill>
+        <a:effectLst/>
       </p:bgPr>
     </p:bg>
     <p:spTree>
@@ -38,7 +134,7 @@
       </p:grpSpPr>
       <p:sp>
         <p:nvSpPr>
-          <p:cNvPr id="0" name="PlaceHolder 1"/>
+          <p:cNvPr id="4" name="PlaceHolder 1"/>
           <p:cNvSpPr>
             <a:spLocks noGrp="1"/>
           </p:cNvSpPr>
@@ -60,9 +156,10 @@
           </a:ln>
         </p:spPr>
         <p:txBody>
-          <a:bodyPr lIns="91440" rIns="91440" tIns="45720" bIns="45720" anchor="b">
+          <a:bodyPr lIns="91440" tIns="45720" rIns="91440" bIns="45720" anchor="b">
             <a:noAutofit/>
           </a:bodyPr>
+          <a:lstStyle/>
           <a:p>
             <a:pPr indent="0" algn="ctr" defTabSz="990720">
               <a:lnSpc>
@@ -71,7 +168,7 @@
               <a:buNone/>
             </a:pPr>
             <a:r>
-              <a:rPr b="0" lang="de-DE" sz="6500" strike="noStrike" u="none">
+              <a:rPr lang="de-DE" sz="6500" b="0" u="none" strike="noStrike">
                 <a:solidFill>
                   <a:schemeClr val="dk1"/>
                 </a:solidFill>
@@ -81,7 +178,7 @@
               </a:rPr>
               <a:t>Mastertitelformat bearbeiten</a:t>
             </a:r>
-            <a:endParaRPr b="0" lang="en-US" sz="6500" strike="noStrike" u="none">
+            <a:endParaRPr lang="en-US" sz="6500" b="0" u="none" strike="noStrike">
               <a:solidFill>
                 <a:schemeClr val="dk1"/>
               </a:solidFill>
@@ -94,7 +191,7 @@
       </p:sp>
       <p:sp>
         <p:nvSpPr>
-          <p:cNvPr id="1" name="PlaceHolder 2"/>
+          <p:cNvPr id="5" name="PlaceHolder 2"/>
           <p:cNvSpPr>
             <a:spLocks noGrp="1"/>
           </p:cNvSpPr>
@@ -116,7 +213,7 @@
           </a:ln>
         </p:spPr>
         <p:txBody>
-          <a:bodyPr lIns="91440" rIns="91440" tIns="45720" bIns="45720" anchor="ctr">
+          <a:bodyPr lIns="91440" tIns="45720" rIns="91440" bIns="45720" anchor="ctr">
             <a:noAutofit/>
           </a:bodyPr>
           <a:lstStyle>
@@ -125,7 +222,7 @@
                 <a:spcPct val="100000"/>
               </a:lnSpc>
               <a:buNone/>
-              <a:defRPr b="0" lang="de-DE" sz="1300" strike="noStrike" u="none">
+              <a:defRPr lang="de-DE" sz="1300" b="0" u="none" strike="noStrike">
                 <a:solidFill>
                   <a:schemeClr val="dk1">
                     <a:tint val="82000"/>
@@ -145,7 +242,7 @@
               <a:buNone/>
             </a:pPr>
             <a:r>
-              <a:rPr b="0" lang="de-DE" sz="1300" strike="noStrike" u="none">
+              <a:rPr lang="de-DE" sz="1300" b="0" u="none" strike="noStrike">
                 <a:solidFill>
                   <a:schemeClr val="dk1">
                     <a:tint val="82000"/>
@@ -157,7 +254,7 @@
               </a:rPr>
               <a:t>&lt;date/time&gt;</a:t>
             </a:r>
-            <a:endParaRPr b="0" lang="en-US" sz="1300" strike="noStrike" u="none">
+            <a:endParaRPr lang="en-US" sz="1300" b="0" u="none" strike="noStrike">
               <a:solidFill>
                 <a:srgbClr val="000000"/>
               </a:solidFill>
@@ -192,13 +289,13 @@
           </a:ln>
         </p:spPr>
         <p:txBody>
-          <a:bodyPr lIns="91440" rIns="91440" tIns="45720" bIns="45720" anchor="ctr">
+          <a:bodyPr lIns="91440" tIns="45720" rIns="91440" bIns="45720" anchor="ctr">
             <a:noAutofit/>
           </a:bodyPr>
           <a:lstStyle>
             <a:lvl1pPr indent="0" algn="ctr">
               <a:buNone/>
-              <a:defRPr b="0" lang="en-US" sz="1400" strike="noStrike" u="none">
+              <a:defRPr lang="en-US" sz="1400" b="0" u="none" strike="noStrike">
                 <a:solidFill>
                   <a:srgbClr val="000000"/>
                 </a:solidFill>
@@ -213,7 +310,7 @@
               <a:buNone/>
             </a:pPr>
             <a:r>
-              <a:rPr b="0" lang="en-US" sz="1400" strike="noStrike" u="none">
+              <a:rPr lang="en-US" sz="1400" b="0" u="none" strike="noStrike">
                 <a:solidFill>
                   <a:srgbClr val="000000"/>
                 </a:solidFill>
@@ -223,14 +320,6 @@
               </a:rPr>
               <a:t>&lt;footer&gt;</a:t>
             </a:r>
-            <a:endParaRPr b="0" lang="en-US" sz="1400" strike="noStrike" u="none">
-              <a:solidFill>
-                <a:srgbClr val="000000"/>
-              </a:solidFill>
-              <a:effectLst/>
-              <a:uFillTx/>
-              <a:latin typeface="Times New Roman"/>
-            </a:endParaRPr>
           </a:p>
         </p:txBody>
       </p:sp>
@@ -258,7 +347,7 @@
           </a:ln>
         </p:spPr>
         <p:txBody>
-          <a:bodyPr lIns="91440" rIns="91440" tIns="45720" bIns="45720" anchor="ctr">
+          <a:bodyPr lIns="91440" tIns="45720" rIns="91440" bIns="45720" anchor="ctr">
             <a:noAutofit/>
           </a:bodyPr>
           <a:lstStyle>
@@ -267,7 +356,7 @@
                 <a:spcPct val="100000"/>
               </a:lnSpc>
               <a:buNone/>
-              <a:defRPr b="0" lang="de-DE" sz="1300" strike="noStrike" u="none">
+              <a:defRPr lang="de-DE" sz="1300" b="0" u="none" strike="noStrike">
                 <a:solidFill>
                   <a:schemeClr val="dk1">
                     <a:tint val="82000"/>
@@ -287,7 +376,7 @@
               <a:buNone/>
             </a:pPr>
             <a:fld id="{6CF443A2-711A-428A-A060-DBACD769B2A4}" type="slidenum">
-              <a:rPr b="0" lang="de-DE" sz="1300" strike="noStrike" u="none">
+              <a:rPr lang="de-DE" sz="1300" b="0" u="none" strike="noStrike">
                 <a:solidFill>
                   <a:schemeClr val="dk1">
                     <a:tint val="82000"/>
@@ -297,9 +386,9 @@
                 <a:uFillTx/>
                 <a:latin typeface="Aptos"/>
               </a:rPr>
-              <a:t>&lt;number&gt;</a:t>
+              <a:t>‹Nr.›</a:t>
             </a:fld>
-            <a:endParaRPr b="0" lang="en-US" sz="1300" strike="noStrike" u="none">
+            <a:endParaRPr lang="en-US" sz="1300" b="0" u="none" strike="noStrike">
               <a:solidFill>
                 <a:srgbClr val="000000"/>
               </a:solidFill>
@@ -312,17 +401,21 @@
       </p:sp>
     </p:spTree>
   </p:cSld>
+  <p:clrMapOvr>
+    <a:masterClrMapping/>
+  </p:clrMapOvr>
 </p:sldLayout>
 </file>
 
 <file path=ppt/slideLayouts/slideLayout10.xml><?xml version="1.0" encoding="utf-8"?>
-<p:sldLayout xmlns:a="http://schemas.openxmlformats.org/drawingml/2006/main" xmlns:p="http://schemas.openxmlformats.org/presentationml/2006/main" xmlns:r="http://schemas.openxmlformats.org/officeDocument/2006/relationships" xmlns:p14="http://schemas.microsoft.com/office/powerpoint/2010/main" xmlns:p15="http://schemas.microsoft.com/office/powerpoint/2012/main" xmlns:mc="http://schemas.openxmlformats.org/markup-compatibility/2006" type="blank" preserve="1">
+<p:sldLayout xmlns:a="http://schemas.openxmlformats.org/drawingml/2006/main" xmlns:r="http://schemas.openxmlformats.org/officeDocument/2006/relationships" xmlns:p="http://schemas.openxmlformats.org/presentationml/2006/main" type="blank" preserve="1">
   <p:cSld name="Inhalt mit Überschrift">
     <p:bg>
       <p:bgPr>
         <a:solidFill>
-          <a:srgbClr val="ffffff"/>
+          <a:srgbClr val="FFFFFF"/>
         </a:solidFill>
+        <a:effectLst/>
       </p:bgPr>
     </p:bg>
     <p:spTree>
@@ -363,9 +456,10 @@
           </a:ln>
         </p:spPr>
         <p:txBody>
-          <a:bodyPr lIns="91440" rIns="91440" tIns="45720" bIns="45720" anchor="b">
+          <a:bodyPr lIns="91440" tIns="45720" rIns="91440" bIns="45720" anchor="b">
             <a:noAutofit/>
           </a:bodyPr>
+          <a:lstStyle/>
           <a:p>
             <a:pPr indent="0" defTabSz="990720">
               <a:lnSpc>
@@ -374,7 +468,7 @@
               <a:buNone/>
             </a:pPr>
             <a:r>
-              <a:rPr b="0" lang="de-DE" sz="3459" strike="noStrike" u="none">
+              <a:rPr lang="de-DE" sz="3459" b="0" u="none" strike="noStrike">
                 <a:solidFill>
                   <a:schemeClr val="dk1"/>
                 </a:solidFill>
@@ -384,7 +478,7 @@
               </a:rPr>
               <a:t>Mastertitelformat bearbeiten</a:t>
             </a:r>
-            <a:endParaRPr b="0" lang="en-US" sz="3459" strike="noStrike" u="none">
+            <a:endParaRPr lang="en-US" sz="3459" b="0" u="none" strike="noStrike">
               <a:solidFill>
                 <a:schemeClr val="dk1"/>
               </a:solidFill>
@@ -419,9 +513,10 @@
           </a:ln>
         </p:spPr>
         <p:txBody>
-          <a:bodyPr lIns="91440" rIns="91440" tIns="45720" bIns="45720" anchor="t">
+          <a:bodyPr lIns="91440" tIns="45720" rIns="91440" bIns="45720" anchor="t">
             <a:noAutofit/>
           </a:bodyPr>
+          <a:lstStyle/>
           <a:p>
             <a:pPr marL="247680" indent="-247680" defTabSz="990720">
               <a:lnSpc>
@@ -437,7 +532,7 @@
               <a:buChar char="•"/>
             </a:pPr>
             <a:r>
-              <a:rPr b="0" lang="de-DE" sz="3459" strike="noStrike" u="none">
+              <a:rPr lang="de-DE" sz="3459" b="0" u="none" strike="noStrike">
                 <a:solidFill>
                   <a:schemeClr val="dk1"/>
                 </a:solidFill>
@@ -447,7 +542,7 @@
               </a:rPr>
               <a:t>Mastertextformat bearbeiten</a:t>
             </a:r>
-            <a:endParaRPr b="0" lang="en-US" sz="3459" strike="noStrike" u="none">
+            <a:endParaRPr lang="en-US" sz="3459" b="0" u="none" strike="noStrike">
               <a:solidFill>
                 <a:schemeClr val="dk1"/>
               </a:solidFill>
@@ -457,7 +552,7 @@
             </a:endParaRPr>
           </a:p>
           <a:p>
-            <a:pPr lvl="1" marL="743040" indent="-247680" defTabSz="990720">
+            <a:pPr marL="743040" lvl="1" indent="-247680" defTabSz="990720">
               <a:lnSpc>
                 <a:spcPct val="90000"/>
               </a:lnSpc>
@@ -471,7 +566,7 @@
               <a:buChar char="•"/>
             </a:pPr>
             <a:r>
-              <a:rPr b="0" lang="de-DE" sz="3040" strike="noStrike" u="none">
+              <a:rPr lang="de-DE" sz="3040" b="0" u="none" strike="noStrike">
                 <a:solidFill>
                   <a:schemeClr val="dk1"/>
                 </a:solidFill>
@@ -481,7 +576,7 @@
               </a:rPr>
               <a:t>Zweite Ebene</a:t>
             </a:r>
-            <a:endParaRPr b="0" lang="en-US" sz="3040" strike="noStrike" u="none">
+            <a:endParaRPr lang="en-US" sz="3040" b="0" u="none" strike="noStrike">
               <a:solidFill>
                 <a:schemeClr val="dk1"/>
               </a:solidFill>
@@ -491,7 +586,7 @@
             </a:endParaRPr>
           </a:p>
           <a:p>
-            <a:pPr lvl="2" marL="1238040" indent="-247680" defTabSz="990720">
+            <a:pPr marL="1238040" lvl="2" indent="-247680" defTabSz="990720">
               <a:lnSpc>
                 <a:spcPct val="90000"/>
               </a:lnSpc>
@@ -505,7 +600,7 @@
               <a:buChar char="•"/>
             </a:pPr>
             <a:r>
-              <a:rPr b="0" lang="de-DE" sz="2600" strike="noStrike" u="none">
+              <a:rPr lang="de-DE" sz="2600" b="0" u="none" strike="noStrike">
                 <a:solidFill>
                   <a:schemeClr val="dk1"/>
                 </a:solidFill>
@@ -515,7 +610,7 @@
               </a:rPr>
               <a:t>Dritte Ebene</a:t>
             </a:r>
-            <a:endParaRPr b="0" lang="en-US" sz="2600" strike="noStrike" u="none">
+            <a:endParaRPr lang="en-US" sz="2600" b="0" u="none" strike="noStrike">
               <a:solidFill>
                 <a:schemeClr val="dk1"/>
               </a:solidFill>
@@ -525,7 +620,7 @@
             </a:endParaRPr>
           </a:p>
           <a:p>
-            <a:pPr lvl="3" marL="1733400" indent="-247680" defTabSz="990720">
+            <a:pPr marL="1733400" lvl="3" indent="-247680" defTabSz="990720">
               <a:lnSpc>
                 <a:spcPct val="90000"/>
               </a:lnSpc>
@@ -539,7 +634,7 @@
               <a:buChar char="•"/>
             </a:pPr>
             <a:r>
-              <a:rPr b="0" lang="de-DE" sz="2170" strike="noStrike" u="none">
+              <a:rPr lang="de-DE" sz="2170" b="0" u="none" strike="noStrike">
                 <a:solidFill>
                   <a:schemeClr val="dk1"/>
                 </a:solidFill>
@@ -549,7 +644,7 @@
               </a:rPr>
               <a:t>Vierte Ebene</a:t>
             </a:r>
-            <a:endParaRPr b="0" lang="en-US" sz="2170" strike="noStrike" u="none">
+            <a:endParaRPr lang="en-US" sz="2170" b="0" u="none" strike="noStrike">
               <a:solidFill>
                 <a:schemeClr val="dk1"/>
               </a:solidFill>
@@ -559,7 +654,7 @@
             </a:endParaRPr>
           </a:p>
           <a:p>
-            <a:pPr lvl="4" marL="2228760" indent="-247680" defTabSz="990720">
+            <a:pPr marL="2228760" lvl="4" indent="-247680" defTabSz="990720">
               <a:lnSpc>
                 <a:spcPct val="90000"/>
               </a:lnSpc>
@@ -573,7 +668,7 @@
               <a:buChar char="•"/>
             </a:pPr>
             <a:r>
-              <a:rPr b="0" lang="de-DE" sz="2170" strike="noStrike" u="none">
+              <a:rPr lang="de-DE" sz="2170" b="0" u="none" strike="noStrike">
                 <a:solidFill>
                   <a:schemeClr val="dk1"/>
                 </a:solidFill>
@@ -583,7 +678,7 @@
               </a:rPr>
               <a:t>Fünfte Ebene</a:t>
             </a:r>
-            <a:endParaRPr b="0" lang="en-US" sz="2170" strike="noStrike" u="none">
+            <a:endParaRPr lang="en-US" sz="2170" b="0" u="none" strike="noStrike">
               <a:solidFill>
                 <a:schemeClr val="dk1"/>
               </a:solidFill>
@@ -618,9 +713,10 @@
           </a:ln>
         </p:spPr>
         <p:txBody>
-          <a:bodyPr lIns="91440" rIns="91440" tIns="45720" bIns="45720" anchor="t">
+          <a:bodyPr lIns="91440" tIns="45720" rIns="91440" bIns="45720" anchor="t">
             <a:noAutofit/>
           </a:bodyPr>
+          <a:lstStyle/>
           <a:p>
             <a:pPr indent="0" defTabSz="990720">
               <a:lnSpc>
@@ -631,11 +727,11 @@
               </a:spcBef>
               <a:buNone/>
               <a:tabLst>
-                <a:tab algn="l" pos="0"/>
+                <a:tab pos="0" algn="l"/>
               </a:tabLst>
             </a:pPr>
             <a:r>
-              <a:rPr b="0" lang="de-DE" sz="1729" strike="noStrike" u="none">
+              <a:rPr lang="de-DE" sz="1729" b="0" u="none" strike="noStrike">
                 <a:solidFill>
                   <a:schemeClr val="dk1"/>
                 </a:solidFill>
@@ -645,7 +741,7 @@
               </a:rPr>
               <a:t>Mastertextformat bearbeiten</a:t>
             </a:r>
-            <a:endParaRPr b="0" lang="en-US" sz="1729" strike="noStrike" u="none">
+            <a:endParaRPr lang="en-US" sz="1729" b="0" u="none" strike="noStrike">
               <a:solidFill>
                 <a:schemeClr val="dk1"/>
               </a:solidFill>
@@ -680,7 +776,7 @@
           </a:ln>
         </p:spPr>
         <p:txBody>
-          <a:bodyPr lIns="91440" rIns="91440" tIns="45720" bIns="45720" anchor="ctr">
+          <a:bodyPr lIns="91440" tIns="45720" rIns="91440" bIns="45720" anchor="ctr">
             <a:noAutofit/>
           </a:bodyPr>
           <a:lstStyle>
@@ -689,7 +785,7 @@
                 <a:spcPct val="100000"/>
               </a:lnSpc>
               <a:buNone/>
-              <a:defRPr b="0" lang="de-DE" sz="1300" strike="noStrike" u="none">
+              <a:defRPr lang="de-DE" sz="1300" b="0" u="none" strike="noStrike">
                 <a:solidFill>
                   <a:schemeClr val="dk1">
                     <a:tint val="82000"/>
@@ -709,7 +805,7 @@
               <a:buNone/>
             </a:pPr>
             <a:r>
-              <a:rPr b="0" lang="de-DE" sz="1300" strike="noStrike" u="none">
+              <a:rPr lang="de-DE" sz="1300" b="0" u="none" strike="noStrike">
                 <a:solidFill>
                   <a:schemeClr val="dk1">
                     <a:tint val="82000"/>
@@ -721,7 +817,7 @@
               </a:rPr>
               <a:t>&lt;date/time&gt;</a:t>
             </a:r>
-            <a:endParaRPr b="0" lang="en-US" sz="1300" strike="noStrike" u="none">
+            <a:endParaRPr lang="en-US" sz="1300" b="0" u="none" strike="noStrike">
               <a:solidFill>
                 <a:srgbClr val="000000"/>
               </a:solidFill>
@@ -756,13 +852,13 @@
           </a:ln>
         </p:spPr>
         <p:txBody>
-          <a:bodyPr lIns="91440" rIns="91440" tIns="45720" bIns="45720" anchor="ctr">
+          <a:bodyPr lIns="91440" tIns="45720" rIns="91440" bIns="45720" anchor="ctr">
             <a:noAutofit/>
           </a:bodyPr>
           <a:lstStyle>
             <a:lvl1pPr indent="0" algn="ctr">
               <a:buNone/>
-              <a:defRPr b="0" lang="en-US" sz="1400" strike="noStrike" u="none">
+              <a:defRPr lang="en-US" sz="1400" b="0" u="none" strike="noStrike">
                 <a:solidFill>
                   <a:srgbClr val="000000"/>
                 </a:solidFill>
@@ -777,7 +873,7 @@
               <a:buNone/>
             </a:pPr>
             <a:r>
-              <a:rPr b="0" lang="en-US" sz="1400" strike="noStrike" u="none">
+              <a:rPr lang="en-US" sz="1400" b="0" u="none" strike="noStrike">
                 <a:solidFill>
                   <a:srgbClr val="000000"/>
                 </a:solidFill>
@@ -787,14 +883,6 @@
               </a:rPr>
               <a:t>&lt;footer&gt;</a:t>
             </a:r>
-            <a:endParaRPr b="0" lang="en-US" sz="1400" strike="noStrike" u="none">
-              <a:solidFill>
-                <a:srgbClr val="000000"/>
-              </a:solidFill>
-              <a:effectLst/>
-              <a:uFillTx/>
-              <a:latin typeface="Times New Roman"/>
-            </a:endParaRPr>
           </a:p>
         </p:txBody>
       </p:sp>
@@ -822,7 +910,7 @@
           </a:ln>
         </p:spPr>
         <p:txBody>
-          <a:bodyPr lIns="91440" rIns="91440" tIns="45720" bIns="45720" anchor="ctr">
+          <a:bodyPr lIns="91440" tIns="45720" rIns="91440" bIns="45720" anchor="ctr">
             <a:noAutofit/>
           </a:bodyPr>
           <a:lstStyle>
@@ -831,7 +919,7 @@
                 <a:spcPct val="100000"/>
               </a:lnSpc>
               <a:buNone/>
-              <a:defRPr b="0" lang="de-DE" sz="1300" strike="noStrike" u="none">
+              <a:defRPr lang="de-DE" sz="1300" b="0" u="none" strike="noStrike">
                 <a:solidFill>
                   <a:schemeClr val="dk1">
                     <a:tint val="82000"/>
@@ -851,7 +939,7 @@
               <a:buNone/>
             </a:pPr>
             <a:fld id="{809F60DA-E785-48C8-8DB2-79E000687EE3}" type="slidenum">
-              <a:rPr b="0" lang="de-DE" sz="1300" strike="noStrike" u="none">
+              <a:rPr lang="de-DE" sz="1300" b="0" u="none" strike="noStrike">
                 <a:solidFill>
                   <a:schemeClr val="dk1">
                     <a:tint val="82000"/>
@@ -861,9 +949,9 @@
                 <a:uFillTx/>
                 <a:latin typeface="Aptos"/>
               </a:rPr>
-              <a:t>&lt;number&gt;</a:t>
+              <a:t>‹Nr.›</a:t>
             </a:fld>
-            <a:endParaRPr b="0" lang="en-US" sz="1300" strike="noStrike" u="none">
+            <a:endParaRPr lang="en-US" sz="1300" b="0" u="none" strike="noStrike">
               <a:solidFill>
                 <a:srgbClr val="000000"/>
               </a:solidFill>
@@ -876,17 +964,21 @@
       </p:sp>
     </p:spTree>
   </p:cSld>
+  <p:clrMapOvr>
+    <a:masterClrMapping/>
+  </p:clrMapOvr>
 </p:sldLayout>
 </file>
 
 <file path=ppt/slideLayouts/slideLayout11.xml><?xml version="1.0" encoding="utf-8"?>
-<p:sldLayout xmlns:a="http://schemas.openxmlformats.org/drawingml/2006/main" xmlns:p="http://schemas.openxmlformats.org/presentationml/2006/main" xmlns:r="http://schemas.openxmlformats.org/officeDocument/2006/relationships" xmlns:p14="http://schemas.microsoft.com/office/powerpoint/2010/main" xmlns:p15="http://schemas.microsoft.com/office/powerpoint/2012/main" xmlns:mc="http://schemas.openxmlformats.org/markup-compatibility/2006" type="blank" preserve="1">
+<p:sldLayout xmlns:a="http://schemas.openxmlformats.org/drawingml/2006/main" xmlns:r="http://schemas.openxmlformats.org/officeDocument/2006/relationships" xmlns:p="http://schemas.openxmlformats.org/presentationml/2006/main" type="blank" preserve="1">
   <p:cSld name="Bild mit Überschrift">
     <p:bg>
       <p:bgPr>
         <a:solidFill>
-          <a:srgbClr val="ffffff"/>
+          <a:srgbClr val="FFFFFF"/>
         </a:solidFill>
+        <a:effectLst/>
       </p:bgPr>
     </p:bg>
     <p:spTree>
@@ -927,9 +1019,10 @@
           </a:ln>
         </p:spPr>
         <p:txBody>
-          <a:bodyPr lIns="91440" rIns="91440" tIns="45720" bIns="45720" anchor="b">
+          <a:bodyPr lIns="91440" tIns="45720" rIns="91440" bIns="45720" anchor="b">
             <a:noAutofit/>
           </a:bodyPr>
+          <a:lstStyle/>
           <a:p>
             <a:pPr indent="0" defTabSz="990720">
               <a:lnSpc>
@@ -938,7 +1031,7 @@
               <a:buNone/>
             </a:pPr>
             <a:r>
-              <a:rPr b="0" lang="de-DE" sz="3459" strike="noStrike" u="none">
+              <a:rPr lang="de-DE" sz="3459" b="0" u="none" strike="noStrike">
                 <a:solidFill>
                   <a:schemeClr val="dk1"/>
                 </a:solidFill>
@@ -948,7 +1041,7 @@
               </a:rPr>
               <a:t>Mastertitelformat bearbeiten</a:t>
             </a:r>
-            <a:endParaRPr b="0" lang="en-US" sz="3459" strike="noStrike" u="none">
+            <a:endParaRPr lang="en-US" sz="3459" b="0" u="none" strike="noStrike">
               <a:solidFill>
                 <a:schemeClr val="dk1"/>
               </a:solidFill>
@@ -983,9 +1076,10 @@
           </a:ln>
         </p:spPr>
         <p:txBody>
-          <a:bodyPr lIns="90000" rIns="90000" tIns="45000" bIns="45000" anchor="t">
+          <a:bodyPr lIns="90000" tIns="45000" rIns="90000" bIns="45000" anchor="t">
             <a:noAutofit/>
           </a:bodyPr>
+          <a:lstStyle/>
           <a:p>
             <a:pPr indent="0" defTabSz="457200">
               <a:lnSpc>
@@ -993,11 +1087,11 @@
               </a:lnSpc>
               <a:buNone/>
               <a:tabLst>
-                <a:tab algn="l" pos="0"/>
+                <a:tab pos="0" algn="l"/>
               </a:tabLst>
             </a:pPr>
             <a:r>
-              <a:rPr b="0" lang="de-DE" sz="3459" strike="noStrike" u="none">
+              <a:rPr lang="de-DE" sz="3459" b="0" u="none" strike="noStrike">
                 <a:solidFill>
                   <a:schemeClr val="dk1"/>
                 </a:solidFill>
@@ -1007,7 +1101,7 @@
               </a:rPr>
               <a:t>Bild durch Klicken auf Symbol hinzufügen</a:t>
             </a:r>
-            <a:endParaRPr b="0" lang="en-US" sz="3459" strike="noStrike" u="none">
+            <a:endParaRPr lang="en-US" sz="3459" b="0" u="none" strike="noStrike">
               <a:solidFill>
                 <a:schemeClr val="dk1"/>
               </a:solidFill>
@@ -1042,9 +1136,10 @@
           </a:ln>
         </p:spPr>
         <p:txBody>
-          <a:bodyPr lIns="91440" rIns="91440" tIns="45720" bIns="45720" anchor="t">
+          <a:bodyPr lIns="91440" tIns="45720" rIns="91440" bIns="45720" anchor="t">
             <a:noAutofit/>
           </a:bodyPr>
+          <a:lstStyle/>
           <a:p>
             <a:pPr indent="0" defTabSz="990720">
               <a:lnSpc>
@@ -1055,11 +1150,11 @@
               </a:spcBef>
               <a:buNone/>
               <a:tabLst>
-                <a:tab algn="l" pos="0"/>
+                <a:tab pos="0" algn="l"/>
               </a:tabLst>
             </a:pPr>
             <a:r>
-              <a:rPr b="0" lang="de-DE" sz="1729" strike="noStrike" u="none">
+              <a:rPr lang="de-DE" sz="1729" b="0" u="none" strike="noStrike">
                 <a:solidFill>
                   <a:schemeClr val="dk1"/>
                 </a:solidFill>
@@ -1069,7 +1164,7 @@
               </a:rPr>
               <a:t>Mastertextformat bearbeiten</a:t>
             </a:r>
-            <a:endParaRPr b="0" lang="en-US" sz="1729" strike="noStrike" u="none">
+            <a:endParaRPr lang="en-US" sz="1729" b="0" u="none" strike="noStrike">
               <a:solidFill>
                 <a:schemeClr val="dk1"/>
               </a:solidFill>
@@ -1104,7 +1199,7 @@
           </a:ln>
         </p:spPr>
         <p:txBody>
-          <a:bodyPr lIns="91440" rIns="91440" tIns="45720" bIns="45720" anchor="ctr">
+          <a:bodyPr lIns="91440" tIns="45720" rIns="91440" bIns="45720" anchor="ctr">
             <a:noAutofit/>
           </a:bodyPr>
           <a:lstStyle>
@@ -1113,7 +1208,7 @@
                 <a:spcPct val="100000"/>
               </a:lnSpc>
               <a:buNone/>
-              <a:defRPr b="0" lang="de-DE" sz="1300" strike="noStrike" u="none">
+              <a:defRPr lang="de-DE" sz="1300" b="0" u="none" strike="noStrike">
                 <a:solidFill>
                   <a:schemeClr val="dk1">
                     <a:tint val="82000"/>
@@ -1133,7 +1228,7 @@
               <a:buNone/>
             </a:pPr>
             <a:r>
-              <a:rPr b="0" lang="de-DE" sz="1300" strike="noStrike" u="none">
+              <a:rPr lang="de-DE" sz="1300" b="0" u="none" strike="noStrike">
                 <a:solidFill>
                   <a:schemeClr val="dk1">
                     <a:tint val="82000"/>
@@ -1145,7 +1240,7 @@
               </a:rPr>
               <a:t>&lt;date/time&gt;</a:t>
             </a:r>
-            <a:endParaRPr b="0" lang="en-US" sz="1300" strike="noStrike" u="none">
+            <a:endParaRPr lang="en-US" sz="1300" b="0" u="none" strike="noStrike">
               <a:solidFill>
                 <a:srgbClr val="000000"/>
               </a:solidFill>
@@ -1180,13 +1275,13 @@
           </a:ln>
         </p:spPr>
         <p:txBody>
-          <a:bodyPr lIns="91440" rIns="91440" tIns="45720" bIns="45720" anchor="ctr">
+          <a:bodyPr lIns="91440" tIns="45720" rIns="91440" bIns="45720" anchor="ctr">
             <a:noAutofit/>
           </a:bodyPr>
           <a:lstStyle>
             <a:lvl1pPr indent="0" algn="ctr">
               <a:buNone/>
-              <a:defRPr b="0" lang="en-US" sz="1400" strike="noStrike" u="none">
+              <a:defRPr lang="en-US" sz="1400" b="0" u="none" strike="noStrike">
                 <a:solidFill>
                   <a:srgbClr val="000000"/>
                 </a:solidFill>
@@ -1201,7 +1296,7 @@
               <a:buNone/>
             </a:pPr>
             <a:r>
-              <a:rPr b="0" lang="en-US" sz="1400" strike="noStrike" u="none">
+              <a:rPr lang="en-US" sz="1400" b="0" u="none" strike="noStrike">
                 <a:solidFill>
                   <a:srgbClr val="000000"/>
                 </a:solidFill>
@@ -1211,14 +1306,6 @@
               </a:rPr>
               <a:t>&lt;footer&gt;</a:t>
             </a:r>
-            <a:endParaRPr b="0" lang="en-US" sz="1400" strike="noStrike" u="none">
-              <a:solidFill>
-                <a:srgbClr val="000000"/>
-              </a:solidFill>
-              <a:effectLst/>
-              <a:uFillTx/>
-              <a:latin typeface="Times New Roman"/>
-            </a:endParaRPr>
           </a:p>
         </p:txBody>
       </p:sp>
@@ -1246,7 +1333,7 @@
           </a:ln>
         </p:spPr>
         <p:txBody>
-          <a:bodyPr lIns="91440" rIns="91440" tIns="45720" bIns="45720" anchor="ctr">
+          <a:bodyPr lIns="91440" tIns="45720" rIns="91440" bIns="45720" anchor="ctr">
             <a:noAutofit/>
           </a:bodyPr>
           <a:lstStyle>
@@ -1255,7 +1342,7 @@
                 <a:spcPct val="100000"/>
               </a:lnSpc>
               <a:buNone/>
-              <a:defRPr b="0" lang="de-DE" sz="1300" strike="noStrike" u="none">
+              <a:defRPr lang="de-DE" sz="1300" b="0" u="none" strike="noStrike">
                 <a:solidFill>
                   <a:schemeClr val="dk1">
                     <a:tint val="82000"/>
@@ -1275,7 +1362,7 @@
               <a:buNone/>
             </a:pPr>
             <a:fld id="{4E39AAEC-4D9E-4434-A4DA-44E6F8F8F8E2}" type="slidenum">
-              <a:rPr b="0" lang="de-DE" sz="1300" strike="noStrike" u="none">
+              <a:rPr lang="de-DE" sz="1300" b="0" u="none" strike="noStrike">
                 <a:solidFill>
                   <a:schemeClr val="dk1">
                     <a:tint val="82000"/>
@@ -1285,9 +1372,9 @@
                 <a:uFillTx/>
                 <a:latin typeface="Aptos"/>
               </a:rPr>
-              <a:t>&lt;number&gt;</a:t>
+              <a:t>‹Nr.›</a:t>
             </a:fld>
-            <a:endParaRPr b="0" lang="en-US" sz="1300" strike="noStrike" u="none">
+            <a:endParaRPr lang="en-US" sz="1300" b="0" u="none" strike="noStrike">
               <a:solidFill>
                 <a:srgbClr val="000000"/>
               </a:solidFill>
@@ -1300,17 +1387,21 @@
       </p:sp>
     </p:spTree>
   </p:cSld>
+  <p:clrMapOvr>
+    <a:masterClrMapping/>
+  </p:clrMapOvr>
 </p:sldLayout>
 </file>
 
 <file path=ppt/slideLayouts/slideLayout2.xml><?xml version="1.0" encoding="utf-8"?>
-<p:sldLayout xmlns:a="http://schemas.openxmlformats.org/drawingml/2006/main" xmlns:p="http://schemas.openxmlformats.org/presentationml/2006/main" xmlns:r="http://schemas.openxmlformats.org/officeDocument/2006/relationships" xmlns:p14="http://schemas.microsoft.com/office/powerpoint/2010/main" xmlns:p15="http://schemas.microsoft.com/office/powerpoint/2012/main" xmlns:mc="http://schemas.openxmlformats.org/markup-compatibility/2006" type="vertTx" preserve="1">
+<p:sldLayout xmlns:a="http://schemas.openxmlformats.org/drawingml/2006/main" xmlns:r="http://schemas.openxmlformats.org/officeDocument/2006/relationships" xmlns:p="http://schemas.openxmlformats.org/presentationml/2006/main" type="vertTx" preserve="1">
   <p:cSld name="Titel und vertikaler Text">
     <p:bg>
       <p:bgPr>
         <a:solidFill>
-          <a:srgbClr val="ffffff"/>
+          <a:srgbClr val="FFFFFF"/>
         </a:solidFill>
+        <a:effectLst/>
       </p:bgPr>
     </p:bg>
     <p:spTree>
@@ -1351,9 +1442,10 @@
           </a:ln>
         </p:spPr>
         <p:txBody>
-          <a:bodyPr lIns="91440" rIns="91440" tIns="45720" bIns="45720" anchor="ctr">
+          <a:bodyPr lIns="91440" tIns="45720" rIns="91440" bIns="45720" anchor="ctr">
             <a:noAutofit/>
           </a:bodyPr>
+          <a:lstStyle/>
           <a:p>
             <a:pPr indent="0" defTabSz="990720">
               <a:lnSpc>
@@ -1362,7 +1454,7 @@
               <a:buNone/>
             </a:pPr>
             <a:r>
-              <a:rPr b="0" lang="de-DE" sz="4770" strike="noStrike" u="none">
+              <a:rPr lang="de-DE" sz="4770" b="0" u="none" strike="noStrike">
                 <a:solidFill>
                   <a:schemeClr val="dk1"/>
                 </a:solidFill>
@@ -1372,7 +1464,7 @@
               </a:rPr>
               <a:t>Mastertitelformat bearbeiten</a:t>
             </a:r>
-            <a:endParaRPr b="0" lang="en-US" sz="4770" strike="noStrike" u="none">
+            <a:endParaRPr lang="en-US" sz="4770" b="0" u="none" strike="noStrike">
               <a:solidFill>
                 <a:schemeClr val="dk1"/>
               </a:solidFill>
@@ -1407,9 +1499,10 @@
           </a:ln>
         </p:spPr>
         <p:txBody>
-          <a:bodyPr lIns="91440" rIns="91440" tIns="45720" bIns="45720" anchor="t" vert="eaVert">
+          <a:bodyPr vert="eaVert" lIns="91440" tIns="45720" rIns="91440" bIns="45720" anchor="t">
             <a:noAutofit/>
           </a:bodyPr>
+          <a:lstStyle/>
           <a:p>
             <a:pPr marL="247680" indent="-247680" defTabSz="990720">
               <a:lnSpc>
@@ -1425,7 +1518,7 @@
               <a:buChar char="•"/>
             </a:pPr>
             <a:r>
-              <a:rPr b="0" lang="de-DE" sz="3040" strike="noStrike" u="none">
+              <a:rPr lang="de-DE" sz="3040" b="0" u="none" strike="noStrike">
                 <a:solidFill>
                   <a:schemeClr val="dk1"/>
                 </a:solidFill>
@@ -1435,7 +1528,7 @@
               </a:rPr>
               <a:t>Mastertextformat bearbeiten</a:t>
             </a:r>
-            <a:endParaRPr b="0" lang="en-US" sz="3040" strike="noStrike" u="none">
+            <a:endParaRPr lang="en-US" sz="3040" b="0" u="none" strike="noStrike">
               <a:solidFill>
                 <a:schemeClr val="dk1"/>
               </a:solidFill>
@@ -1445,7 +1538,7 @@
             </a:endParaRPr>
           </a:p>
           <a:p>
-            <a:pPr lvl="1" marL="743040" indent="-247680" defTabSz="990720">
+            <a:pPr marL="743040" lvl="1" indent="-247680" defTabSz="990720">
               <a:lnSpc>
                 <a:spcPct val="90000"/>
               </a:lnSpc>
@@ -1459,7 +1552,7 @@
               <a:buChar char="•"/>
             </a:pPr>
             <a:r>
-              <a:rPr b="0" lang="de-DE" sz="2600" strike="noStrike" u="none">
+              <a:rPr lang="de-DE" sz="2600" b="0" u="none" strike="noStrike">
                 <a:solidFill>
                   <a:schemeClr val="dk1"/>
                 </a:solidFill>
@@ -1469,7 +1562,7 @@
               </a:rPr>
               <a:t>Zweite Ebene</a:t>
             </a:r>
-            <a:endParaRPr b="0" lang="en-US" sz="2600" strike="noStrike" u="none">
+            <a:endParaRPr lang="en-US" sz="2600" b="0" u="none" strike="noStrike">
               <a:solidFill>
                 <a:schemeClr val="dk1"/>
               </a:solidFill>
@@ -1479,7 +1572,7 @@
             </a:endParaRPr>
           </a:p>
           <a:p>
-            <a:pPr lvl="2" marL="1238040" indent="-247680" defTabSz="990720">
+            <a:pPr marL="1238040" lvl="2" indent="-247680" defTabSz="990720">
               <a:lnSpc>
                 <a:spcPct val="90000"/>
               </a:lnSpc>
@@ -1493,7 +1586,7 @@
               <a:buChar char="•"/>
             </a:pPr>
             <a:r>
-              <a:rPr b="0" lang="de-DE" sz="2170" strike="noStrike" u="none">
+              <a:rPr lang="de-DE" sz="2170" b="0" u="none" strike="noStrike">
                 <a:solidFill>
                   <a:schemeClr val="dk1"/>
                 </a:solidFill>
@@ -1503,7 +1596,7 @@
               </a:rPr>
               <a:t>Dritte Ebene</a:t>
             </a:r>
-            <a:endParaRPr b="0" lang="en-US" sz="2170" strike="noStrike" u="none">
+            <a:endParaRPr lang="en-US" sz="2170" b="0" u="none" strike="noStrike">
               <a:solidFill>
                 <a:schemeClr val="dk1"/>
               </a:solidFill>
@@ -1513,7 +1606,7 @@
             </a:endParaRPr>
           </a:p>
           <a:p>
-            <a:pPr lvl="3" marL="1733400" indent="-247680" defTabSz="990720">
+            <a:pPr marL="1733400" lvl="3" indent="-247680" defTabSz="990720">
               <a:lnSpc>
                 <a:spcPct val="90000"/>
               </a:lnSpc>
@@ -1527,7 +1620,7 @@
               <a:buChar char="•"/>
             </a:pPr>
             <a:r>
-              <a:rPr b="0" lang="de-DE" sz="1950" strike="noStrike" u="none">
+              <a:rPr lang="de-DE" sz="1950" b="0" u="none" strike="noStrike">
                 <a:solidFill>
                   <a:schemeClr val="dk1"/>
                 </a:solidFill>
@@ -1537,7 +1630,7 @@
               </a:rPr>
               <a:t>Vierte Ebene</a:t>
             </a:r>
-            <a:endParaRPr b="0" lang="en-US" sz="1950" strike="noStrike" u="none">
+            <a:endParaRPr lang="en-US" sz="1950" b="0" u="none" strike="noStrike">
               <a:solidFill>
                 <a:schemeClr val="dk1"/>
               </a:solidFill>
@@ -1547,7 +1640,7 @@
             </a:endParaRPr>
           </a:p>
           <a:p>
-            <a:pPr lvl="4" marL="2228760" indent="-247680" defTabSz="990720">
+            <a:pPr marL="2228760" lvl="4" indent="-247680" defTabSz="990720">
               <a:lnSpc>
                 <a:spcPct val="90000"/>
               </a:lnSpc>
@@ -1561,7 +1654,7 @@
               <a:buChar char="•"/>
             </a:pPr>
             <a:r>
-              <a:rPr b="0" lang="de-DE" sz="1950" strike="noStrike" u="none">
+              <a:rPr lang="de-DE" sz="1950" b="0" u="none" strike="noStrike">
                 <a:solidFill>
                   <a:schemeClr val="dk1"/>
                 </a:solidFill>
@@ -1571,7 +1664,7 @@
               </a:rPr>
               <a:t>Fünfte Ebene</a:t>
             </a:r>
-            <a:endParaRPr b="0" lang="en-US" sz="1950" strike="noStrike" u="none">
+            <a:endParaRPr lang="en-US" sz="1950" b="0" u="none" strike="noStrike">
               <a:solidFill>
                 <a:schemeClr val="dk1"/>
               </a:solidFill>
@@ -1606,7 +1699,7 @@
           </a:ln>
         </p:spPr>
         <p:txBody>
-          <a:bodyPr lIns="91440" rIns="91440" tIns="45720" bIns="45720" anchor="ctr">
+          <a:bodyPr lIns="91440" tIns="45720" rIns="91440" bIns="45720" anchor="ctr">
             <a:noAutofit/>
           </a:bodyPr>
           <a:lstStyle>
@@ -1615,7 +1708,7 @@
                 <a:spcPct val="100000"/>
               </a:lnSpc>
               <a:buNone/>
-              <a:defRPr b="0" lang="de-DE" sz="1300" strike="noStrike" u="none">
+              <a:defRPr lang="de-DE" sz="1300" b="0" u="none" strike="noStrike">
                 <a:solidFill>
                   <a:schemeClr val="dk1">
                     <a:tint val="82000"/>
@@ -1635,7 +1728,7 @@
               <a:buNone/>
             </a:pPr>
             <a:r>
-              <a:rPr b="0" lang="de-DE" sz="1300" strike="noStrike" u="none">
+              <a:rPr lang="de-DE" sz="1300" b="0" u="none" strike="noStrike">
                 <a:solidFill>
                   <a:schemeClr val="dk1">
                     <a:tint val="82000"/>
@@ -1647,7 +1740,7 @@
               </a:rPr>
               <a:t>&lt;date/time&gt;</a:t>
             </a:r>
-            <a:endParaRPr b="0" lang="en-US" sz="1300" strike="noStrike" u="none">
+            <a:endParaRPr lang="en-US" sz="1300" b="0" u="none" strike="noStrike">
               <a:solidFill>
                 <a:srgbClr val="000000"/>
               </a:solidFill>
@@ -1682,13 +1775,13 @@
           </a:ln>
         </p:spPr>
         <p:txBody>
-          <a:bodyPr lIns="91440" rIns="91440" tIns="45720" bIns="45720" anchor="ctr">
+          <a:bodyPr lIns="91440" tIns="45720" rIns="91440" bIns="45720" anchor="ctr">
             <a:noAutofit/>
           </a:bodyPr>
           <a:lstStyle>
             <a:lvl1pPr indent="0" algn="ctr">
               <a:buNone/>
-              <a:defRPr b="0" lang="en-US" sz="1400" strike="noStrike" u="none">
+              <a:defRPr lang="en-US" sz="1400" b="0" u="none" strike="noStrike">
                 <a:solidFill>
                   <a:srgbClr val="000000"/>
                 </a:solidFill>
@@ -1703,7 +1796,7 @@
               <a:buNone/>
             </a:pPr>
             <a:r>
-              <a:rPr b="0" lang="en-US" sz="1400" strike="noStrike" u="none">
+              <a:rPr lang="en-US" sz="1400" b="0" u="none" strike="noStrike">
                 <a:solidFill>
                   <a:srgbClr val="000000"/>
                 </a:solidFill>
@@ -1713,14 +1806,6 @@
               </a:rPr>
               <a:t>&lt;footer&gt;</a:t>
             </a:r>
-            <a:endParaRPr b="0" lang="en-US" sz="1400" strike="noStrike" u="none">
-              <a:solidFill>
-                <a:srgbClr val="000000"/>
-              </a:solidFill>
-              <a:effectLst/>
-              <a:uFillTx/>
-              <a:latin typeface="Times New Roman"/>
-            </a:endParaRPr>
           </a:p>
         </p:txBody>
       </p:sp>
@@ -1748,7 +1833,7 @@
           </a:ln>
         </p:spPr>
         <p:txBody>
-          <a:bodyPr lIns="91440" rIns="91440" tIns="45720" bIns="45720" anchor="ctr">
+          <a:bodyPr lIns="91440" tIns="45720" rIns="91440" bIns="45720" anchor="ctr">
             <a:noAutofit/>
           </a:bodyPr>
           <a:lstStyle>
@@ -1757,7 +1842,7 @@
                 <a:spcPct val="100000"/>
               </a:lnSpc>
               <a:buNone/>
-              <a:defRPr b="0" lang="de-DE" sz="1300" strike="noStrike" u="none">
+              <a:defRPr lang="de-DE" sz="1300" b="0" u="none" strike="noStrike">
                 <a:solidFill>
                   <a:schemeClr val="dk1">
                     <a:tint val="82000"/>
@@ -1777,7 +1862,7 @@
               <a:buNone/>
             </a:pPr>
             <a:fld id="{2666E65C-85C2-405A-A301-A7BF4F8059BF}" type="slidenum">
-              <a:rPr b="0" lang="de-DE" sz="1300" strike="noStrike" u="none">
+              <a:rPr lang="de-DE" sz="1300" b="0" u="none" strike="noStrike">
                 <a:solidFill>
                   <a:schemeClr val="dk1">
                     <a:tint val="82000"/>
@@ -1787,9 +1872,9 @@
                 <a:uFillTx/>
                 <a:latin typeface="Aptos"/>
               </a:rPr>
-              <a:t>&lt;number&gt;</a:t>
+              <a:t>‹Nr.›</a:t>
             </a:fld>
-            <a:endParaRPr b="0" lang="en-US" sz="1300" strike="noStrike" u="none">
+            <a:endParaRPr lang="en-US" sz="1300" b="0" u="none" strike="noStrike">
               <a:solidFill>
                 <a:srgbClr val="000000"/>
               </a:solidFill>
@@ -1802,17 +1887,21 @@
       </p:sp>
     </p:spTree>
   </p:cSld>
+  <p:clrMapOvr>
+    <a:masterClrMapping/>
+  </p:clrMapOvr>
 </p:sldLayout>
 </file>
 
 <file path=ppt/slideLayouts/slideLayout3.xml><?xml version="1.0" encoding="utf-8"?>
-<p:sldLayout xmlns:a="http://schemas.openxmlformats.org/drawingml/2006/main" xmlns:p="http://schemas.openxmlformats.org/presentationml/2006/main" xmlns:r="http://schemas.openxmlformats.org/officeDocument/2006/relationships" xmlns:p14="http://schemas.microsoft.com/office/powerpoint/2010/main" xmlns:p15="http://schemas.microsoft.com/office/powerpoint/2012/main" xmlns:mc="http://schemas.openxmlformats.org/markup-compatibility/2006" type="vertTitleAndTx" preserve="1">
+<p:sldLayout xmlns:a="http://schemas.openxmlformats.org/drawingml/2006/main" xmlns:r="http://schemas.openxmlformats.org/officeDocument/2006/relationships" xmlns:p="http://schemas.openxmlformats.org/presentationml/2006/main" type="vertTitleAndTx" preserve="1">
   <p:cSld name="Vertikaler Titel und Text">
     <p:bg>
       <p:bgPr>
         <a:solidFill>
-          <a:srgbClr val="ffffff"/>
+          <a:srgbClr val="FFFFFF"/>
         </a:solidFill>
+        <a:effectLst/>
       </p:bgPr>
     </p:bg>
     <p:spTree>
@@ -1853,9 +1942,10 @@
           </a:ln>
         </p:spPr>
         <p:txBody>
-          <a:bodyPr lIns="91440" rIns="91440" tIns="45720" bIns="45720" anchor="ctr" vert="eaVert">
+          <a:bodyPr vert="eaVert" lIns="91440" tIns="45720" rIns="91440" bIns="45720" anchor="ctr">
             <a:noAutofit/>
           </a:bodyPr>
+          <a:lstStyle/>
           <a:p>
             <a:pPr indent="0" defTabSz="990720">
               <a:lnSpc>
@@ -1864,7 +1954,7 @@
               <a:buNone/>
             </a:pPr>
             <a:r>
-              <a:rPr b="0" lang="de-DE" sz="4770" strike="noStrike" u="none">
+              <a:rPr lang="de-DE" sz="4770" b="0" u="none" strike="noStrike">
                 <a:solidFill>
                   <a:schemeClr val="dk1"/>
                 </a:solidFill>
@@ -1874,7 +1964,7 @@
               </a:rPr>
               <a:t>Mastertitelformat bearbeiten</a:t>
             </a:r>
-            <a:endParaRPr b="0" lang="en-US" sz="4770" strike="noStrike" u="none">
+            <a:endParaRPr lang="en-US" sz="4770" b="0" u="none" strike="noStrike">
               <a:solidFill>
                 <a:schemeClr val="dk1"/>
               </a:solidFill>
@@ -1909,9 +1999,10 @@
           </a:ln>
         </p:spPr>
         <p:txBody>
-          <a:bodyPr lIns="91440" rIns="91440" tIns="45720" bIns="45720" anchor="t" vert="eaVert">
+          <a:bodyPr vert="eaVert" lIns="91440" tIns="45720" rIns="91440" bIns="45720" anchor="t">
             <a:noAutofit/>
           </a:bodyPr>
+          <a:lstStyle/>
           <a:p>
             <a:pPr marL="247680" indent="-247680" defTabSz="990720">
               <a:lnSpc>
@@ -1927,7 +2018,7 @@
               <a:buChar char="•"/>
             </a:pPr>
             <a:r>
-              <a:rPr b="0" lang="de-DE" sz="3040" strike="noStrike" u="none">
+              <a:rPr lang="de-DE" sz="3040" b="0" u="none" strike="noStrike">
                 <a:solidFill>
                   <a:schemeClr val="dk1"/>
                 </a:solidFill>
@@ -1937,7 +2028,7 @@
               </a:rPr>
               <a:t>Mastertextformat bearbeiten</a:t>
             </a:r>
-            <a:endParaRPr b="0" lang="en-US" sz="3040" strike="noStrike" u="none">
+            <a:endParaRPr lang="en-US" sz="3040" b="0" u="none" strike="noStrike">
               <a:solidFill>
                 <a:schemeClr val="dk1"/>
               </a:solidFill>
@@ -1947,7 +2038,7 @@
             </a:endParaRPr>
           </a:p>
           <a:p>
-            <a:pPr lvl="1" marL="743040" indent="-247680" defTabSz="990720">
+            <a:pPr marL="743040" lvl="1" indent="-247680" defTabSz="990720">
               <a:lnSpc>
                 <a:spcPct val="90000"/>
               </a:lnSpc>
@@ -1961,7 +2052,7 @@
               <a:buChar char="•"/>
             </a:pPr>
             <a:r>
-              <a:rPr b="0" lang="de-DE" sz="2600" strike="noStrike" u="none">
+              <a:rPr lang="de-DE" sz="2600" b="0" u="none" strike="noStrike">
                 <a:solidFill>
                   <a:schemeClr val="dk1"/>
                 </a:solidFill>
@@ -1971,7 +2062,7 @@
               </a:rPr>
               <a:t>Zweite Ebene</a:t>
             </a:r>
-            <a:endParaRPr b="0" lang="en-US" sz="2600" strike="noStrike" u="none">
+            <a:endParaRPr lang="en-US" sz="2600" b="0" u="none" strike="noStrike">
               <a:solidFill>
                 <a:schemeClr val="dk1"/>
               </a:solidFill>
@@ -1981,7 +2072,7 @@
             </a:endParaRPr>
           </a:p>
           <a:p>
-            <a:pPr lvl="2" marL="1238040" indent="-247680" defTabSz="990720">
+            <a:pPr marL="1238040" lvl="2" indent="-247680" defTabSz="990720">
               <a:lnSpc>
                 <a:spcPct val="90000"/>
               </a:lnSpc>
@@ -1995,7 +2086,7 @@
               <a:buChar char="•"/>
             </a:pPr>
             <a:r>
-              <a:rPr b="0" lang="de-DE" sz="2170" strike="noStrike" u="none">
+              <a:rPr lang="de-DE" sz="2170" b="0" u="none" strike="noStrike">
                 <a:solidFill>
                   <a:schemeClr val="dk1"/>
                 </a:solidFill>
@@ -2005,7 +2096,7 @@
               </a:rPr>
               <a:t>Dritte Ebene</a:t>
             </a:r>
-            <a:endParaRPr b="0" lang="en-US" sz="2170" strike="noStrike" u="none">
+            <a:endParaRPr lang="en-US" sz="2170" b="0" u="none" strike="noStrike">
               <a:solidFill>
                 <a:schemeClr val="dk1"/>
               </a:solidFill>
@@ -2015,7 +2106,7 @@
             </a:endParaRPr>
           </a:p>
           <a:p>
-            <a:pPr lvl="3" marL="1733400" indent="-247680" defTabSz="990720">
+            <a:pPr marL="1733400" lvl="3" indent="-247680" defTabSz="990720">
               <a:lnSpc>
                 <a:spcPct val="90000"/>
               </a:lnSpc>
@@ -2029,7 +2120,7 @@
               <a:buChar char="•"/>
             </a:pPr>
             <a:r>
-              <a:rPr b="0" lang="de-DE" sz="1950" strike="noStrike" u="none">
+              <a:rPr lang="de-DE" sz="1950" b="0" u="none" strike="noStrike">
                 <a:solidFill>
                   <a:schemeClr val="dk1"/>
                 </a:solidFill>
@@ -2039,7 +2130,7 @@
               </a:rPr>
               <a:t>Vierte Ebene</a:t>
             </a:r>
-            <a:endParaRPr b="0" lang="en-US" sz="1950" strike="noStrike" u="none">
+            <a:endParaRPr lang="en-US" sz="1950" b="0" u="none" strike="noStrike">
               <a:solidFill>
                 <a:schemeClr val="dk1"/>
               </a:solidFill>
@@ -2049,7 +2140,7 @@
             </a:endParaRPr>
           </a:p>
           <a:p>
-            <a:pPr lvl="4" marL="2228760" indent="-247680" defTabSz="990720">
+            <a:pPr marL="2228760" lvl="4" indent="-247680" defTabSz="990720">
               <a:lnSpc>
                 <a:spcPct val="90000"/>
               </a:lnSpc>
@@ -2063,7 +2154,7 @@
               <a:buChar char="•"/>
             </a:pPr>
             <a:r>
-              <a:rPr b="0" lang="de-DE" sz="1950" strike="noStrike" u="none">
+              <a:rPr lang="de-DE" sz="1950" b="0" u="none" strike="noStrike">
                 <a:solidFill>
                   <a:schemeClr val="dk1"/>
                 </a:solidFill>
@@ -2073,7 +2164,7 @@
               </a:rPr>
               <a:t>Fünfte Ebene</a:t>
             </a:r>
-            <a:endParaRPr b="0" lang="en-US" sz="1950" strike="noStrike" u="none">
+            <a:endParaRPr lang="en-US" sz="1950" b="0" u="none" strike="noStrike">
               <a:solidFill>
                 <a:schemeClr val="dk1"/>
               </a:solidFill>
@@ -2108,7 +2199,7 @@
           </a:ln>
         </p:spPr>
         <p:txBody>
-          <a:bodyPr lIns="91440" rIns="91440" tIns="45720" bIns="45720" anchor="ctr">
+          <a:bodyPr lIns="91440" tIns="45720" rIns="91440" bIns="45720" anchor="ctr">
             <a:noAutofit/>
           </a:bodyPr>
           <a:lstStyle>
@@ -2117,7 +2208,7 @@
                 <a:spcPct val="100000"/>
               </a:lnSpc>
               <a:buNone/>
-              <a:defRPr b="0" lang="de-DE" sz="1300" strike="noStrike" u="none">
+              <a:defRPr lang="de-DE" sz="1300" b="0" u="none" strike="noStrike">
                 <a:solidFill>
                   <a:schemeClr val="dk1">
                     <a:tint val="82000"/>
@@ -2137,7 +2228,7 @@
               <a:buNone/>
             </a:pPr>
             <a:r>
-              <a:rPr b="0" lang="de-DE" sz="1300" strike="noStrike" u="none">
+              <a:rPr lang="de-DE" sz="1300" b="0" u="none" strike="noStrike">
                 <a:solidFill>
                   <a:schemeClr val="dk1">
                     <a:tint val="82000"/>
@@ -2149,7 +2240,7 @@
               </a:rPr>
               <a:t>&lt;date/time&gt;</a:t>
             </a:r>
-            <a:endParaRPr b="0" lang="en-US" sz="1300" strike="noStrike" u="none">
+            <a:endParaRPr lang="en-US" sz="1300" b="0" u="none" strike="noStrike">
               <a:solidFill>
                 <a:srgbClr val="000000"/>
               </a:solidFill>
@@ -2184,13 +2275,13 @@
           </a:ln>
         </p:spPr>
         <p:txBody>
-          <a:bodyPr lIns="91440" rIns="91440" tIns="45720" bIns="45720" anchor="ctr">
+          <a:bodyPr lIns="91440" tIns="45720" rIns="91440" bIns="45720" anchor="ctr">
             <a:noAutofit/>
           </a:bodyPr>
           <a:lstStyle>
             <a:lvl1pPr indent="0" algn="ctr">
               <a:buNone/>
-              <a:defRPr b="0" lang="en-US" sz="1400" strike="noStrike" u="none">
+              <a:defRPr lang="en-US" sz="1400" b="0" u="none" strike="noStrike">
                 <a:solidFill>
                   <a:srgbClr val="000000"/>
                 </a:solidFill>
@@ -2205,7 +2296,7 @@
               <a:buNone/>
             </a:pPr>
             <a:r>
-              <a:rPr b="0" lang="en-US" sz="1400" strike="noStrike" u="none">
+              <a:rPr lang="en-US" sz="1400" b="0" u="none" strike="noStrike">
                 <a:solidFill>
                   <a:srgbClr val="000000"/>
                 </a:solidFill>
@@ -2215,14 +2306,6 @@
               </a:rPr>
               <a:t>&lt;footer&gt;</a:t>
             </a:r>
-            <a:endParaRPr b="0" lang="en-US" sz="1400" strike="noStrike" u="none">
-              <a:solidFill>
-                <a:srgbClr val="000000"/>
-              </a:solidFill>
-              <a:effectLst/>
-              <a:uFillTx/>
-              <a:latin typeface="Times New Roman"/>
-            </a:endParaRPr>
           </a:p>
         </p:txBody>
       </p:sp>
@@ -2250,7 +2333,7 @@
           </a:ln>
         </p:spPr>
         <p:txBody>
-          <a:bodyPr lIns="91440" rIns="91440" tIns="45720" bIns="45720" anchor="ctr">
+          <a:bodyPr lIns="91440" tIns="45720" rIns="91440" bIns="45720" anchor="ctr">
             <a:noAutofit/>
           </a:bodyPr>
           <a:lstStyle>
@@ -2259,7 +2342,7 @@
                 <a:spcPct val="100000"/>
               </a:lnSpc>
               <a:buNone/>
-              <a:defRPr b="0" lang="de-DE" sz="1300" strike="noStrike" u="none">
+              <a:defRPr lang="de-DE" sz="1300" b="0" u="none" strike="noStrike">
                 <a:solidFill>
                   <a:schemeClr val="dk1">
                     <a:tint val="82000"/>
@@ -2279,7 +2362,7 @@
               <a:buNone/>
             </a:pPr>
             <a:fld id="{4AF6488E-F648-4B14-866A-53B873B09016}" type="slidenum">
-              <a:rPr b="0" lang="de-DE" sz="1300" strike="noStrike" u="none">
+              <a:rPr lang="de-DE" sz="1300" b="0" u="none" strike="noStrike">
                 <a:solidFill>
                   <a:schemeClr val="dk1">
                     <a:tint val="82000"/>
@@ -2289,9 +2372,9 @@
                 <a:uFillTx/>
                 <a:latin typeface="Aptos"/>
               </a:rPr>
-              <a:t>&lt;number&gt;</a:t>
+              <a:t>‹Nr.›</a:t>
             </a:fld>
-            <a:endParaRPr b="0" lang="en-US" sz="1300" strike="noStrike" u="none">
+            <a:endParaRPr lang="en-US" sz="1300" b="0" u="none" strike="noStrike">
               <a:solidFill>
                 <a:srgbClr val="000000"/>
               </a:solidFill>
@@ -2304,17 +2387,21 @@
       </p:sp>
     </p:spTree>
   </p:cSld>
+  <p:clrMapOvr>
+    <a:masterClrMapping/>
+  </p:clrMapOvr>
 </p:sldLayout>
 </file>
 
 <file path=ppt/slideLayouts/slideLayout4.xml><?xml version="1.0" encoding="utf-8"?>
-<p:sldLayout xmlns:a="http://schemas.openxmlformats.org/drawingml/2006/main" xmlns:p="http://schemas.openxmlformats.org/presentationml/2006/main" xmlns:r="http://schemas.openxmlformats.org/officeDocument/2006/relationships" xmlns:p14="http://schemas.microsoft.com/office/powerpoint/2010/main" xmlns:p15="http://schemas.microsoft.com/office/powerpoint/2012/main" xmlns:mc="http://schemas.openxmlformats.org/markup-compatibility/2006" type="obj" preserve="1">
+<p:sldLayout xmlns:a="http://schemas.openxmlformats.org/drawingml/2006/main" xmlns:r="http://schemas.openxmlformats.org/officeDocument/2006/relationships" xmlns:p="http://schemas.openxmlformats.org/presentationml/2006/main" type="obj" preserve="1">
   <p:cSld name="Titel und Inhalt">
     <p:bg>
       <p:bgPr>
         <a:solidFill>
-          <a:srgbClr val="ffffff"/>
+          <a:srgbClr val="FFFFFF"/>
         </a:solidFill>
+        <a:effectLst/>
       </p:bgPr>
     </p:bg>
     <p:spTree>
@@ -2355,9 +2442,10 @@
           </a:ln>
         </p:spPr>
         <p:txBody>
-          <a:bodyPr lIns="91440" rIns="91440" tIns="45720" bIns="45720" anchor="ctr">
+          <a:bodyPr lIns="91440" tIns="45720" rIns="91440" bIns="45720" anchor="ctr">
             <a:noAutofit/>
           </a:bodyPr>
+          <a:lstStyle/>
           <a:p>
             <a:pPr indent="0" defTabSz="990720">
               <a:lnSpc>
@@ -2366,7 +2454,7 @@
               <a:buNone/>
             </a:pPr>
             <a:r>
-              <a:rPr b="0" lang="de-DE" sz="4770" strike="noStrike" u="none">
+              <a:rPr lang="de-DE" sz="4770" b="0" u="none" strike="noStrike">
                 <a:solidFill>
                   <a:schemeClr val="dk1"/>
                 </a:solidFill>
@@ -2376,7 +2464,7 @@
               </a:rPr>
               <a:t>Mastertitelformat bearbeiten</a:t>
             </a:r>
-            <a:endParaRPr b="0" lang="en-US" sz="4770" strike="noStrike" u="none">
+            <a:endParaRPr lang="en-US" sz="4770" b="0" u="none" strike="noStrike">
               <a:solidFill>
                 <a:schemeClr val="dk1"/>
               </a:solidFill>
@@ -2411,9 +2499,10 @@
           </a:ln>
         </p:spPr>
         <p:txBody>
-          <a:bodyPr lIns="91440" rIns="91440" tIns="45720" bIns="45720" anchor="t">
+          <a:bodyPr lIns="91440" tIns="45720" rIns="91440" bIns="45720" anchor="t">
             <a:noAutofit/>
           </a:bodyPr>
+          <a:lstStyle/>
           <a:p>
             <a:pPr marL="247680" indent="-247680" defTabSz="990720">
               <a:lnSpc>
@@ -2429,7 +2518,7 @@
               <a:buChar char="•"/>
             </a:pPr>
             <a:r>
-              <a:rPr b="0" lang="de-DE" sz="3040" strike="noStrike" u="none">
+              <a:rPr lang="de-DE" sz="3040" b="0" u="none" strike="noStrike">
                 <a:solidFill>
                   <a:schemeClr val="dk1"/>
                 </a:solidFill>
@@ -2439,7 +2528,7 @@
               </a:rPr>
               <a:t>Mastertextformat bearbeiten</a:t>
             </a:r>
-            <a:endParaRPr b="0" lang="en-US" sz="3040" strike="noStrike" u="none">
+            <a:endParaRPr lang="en-US" sz="3040" b="0" u="none" strike="noStrike">
               <a:solidFill>
                 <a:schemeClr val="dk1"/>
               </a:solidFill>
@@ -2449,7 +2538,7 @@
             </a:endParaRPr>
           </a:p>
           <a:p>
-            <a:pPr lvl="1" marL="743040" indent="-247680" defTabSz="990720">
+            <a:pPr marL="743040" lvl="1" indent="-247680" defTabSz="990720">
               <a:lnSpc>
                 <a:spcPct val="90000"/>
               </a:lnSpc>
@@ -2463,7 +2552,7 @@
               <a:buChar char="•"/>
             </a:pPr>
             <a:r>
-              <a:rPr b="0" lang="de-DE" sz="2600" strike="noStrike" u="none">
+              <a:rPr lang="de-DE" sz="2600" b="0" u="none" strike="noStrike">
                 <a:solidFill>
                   <a:schemeClr val="dk1"/>
                 </a:solidFill>
@@ -2473,7 +2562,7 @@
               </a:rPr>
               <a:t>Zweite Ebene</a:t>
             </a:r>
-            <a:endParaRPr b="0" lang="en-US" sz="2600" strike="noStrike" u="none">
+            <a:endParaRPr lang="en-US" sz="2600" b="0" u="none" strike="noStrike">
               <a:solidFill>
                 <a:schemeClr val="dk1"/>
               </a:solidFill>
@@ -2483,7 +2572,7 @@
             </a:endParaRPr>
           </a:p>
           <a:p>
-            <a:pPr lvl="2" marL="1238040" indent="-247680" defTabSz="990720">
+            <a:pPr marL="1238040" lvl="2" indent="-247680" defTabSz="990720">
               <a:lnSpc>
                 <a:spcPct val="90000"/>
               </a:lnSpc>
@@ -2497,7 +2586,7 @@
               <a:buChar char="•"/>
             </a:pPr>
             <a:r>
-              <a:rPr b="0" lang="de-DE" sz="2170" strike="noStrike" u="none">
+              <a:rPr lang="de-DE" sz="2170" b="0" u="none" strike="noStrike">
                 <a:solidFill>
                   <a:schemeClr val="dk1"/>
                 </a:solidFill>
@@ -2507,7 +2596,7 @@
               </a:rPr>
               <a:t>Dritte Ebene</a:t>
             </a:r>
-            <a:endParaRPr b="0" lang="en-US" sz="2170" strike="noStrike" u="none">
+            <a:endParaRPr lang="en-US" sz="2170" b="0" u="none" strike="noStrike">
               <a:solidFill>
                 <a:schemeClr val="dk1"/>
               </a:solidFill>
@@ -2517,7 +2606,7 @@
             </a:endParaRPr>
           </a:p>
           <a:p>
-            <a:pPr lvl="3" marL="1733400" indent="-247680" defTabSz="990720">
+            <a:pPr marL="1733400" lvl="3" indent="-247680" defTabSz="990720">
               <a:lnSpc>
                 <a:spcPct val="90000"/>
               </a:lnSpc>
@@ -2531,7 +2620,7 @@
               <a:buChar char="•"/>
             </a:pPr>
             <a:r>
-              <a:rPr b="0" lang="de-DE" sz="1950" strike="noStrike" u="none">
+              <a:rPr lang="de-DE" sz="1950" b="0" u="none" strike="noStrike">
                 <a:solidFill>
                   <a:schemeClr val="dk1"/>
                 </a:solidFill>
@@ -2541,7 +2630,7 @@
               </a:rPr>
               <a:t>Vierte Ebene</a:t>
             </a:r>
-            <a:endParaRPr b="0" lang="en-US" sz="1950" strike="noStrike" u="none">
+            <a:endParaRPr lang="en-US" sz="1950" b="0" u="none" strike="noStrike">
               <a:solidFill>
                 <a:schemeClr val="dk1"/>
               </a:solidFill>
@@ -2551,7 +2640,7 @@
             </a:endParaRPr>
           </a:p>
           <a:p>
-            <a:pPr lvl="4" marL="2228760" indent="-247680" defTabSz="990720">
+            <a:pPr marL="2228760" lvl="4" indent="-247680" defTabSz="990720">
               <a:lnSpc>
                 <a:spcPct val="90000"/>
               </a:lnSpc>
@@ -2565,7 +2654,7 @@
               <a:buChar char="•"/>
             </a:pPr>
             <a:r>
-              <a:rPr b="0" lang="de-DE" sz="1950" strike="noStrike" u="none">
+              <a:rPr lang="de-DE" sz="1950" b="0" u="none" strike="noStrike">
                 <a:solidFill>
                   <a:schemeClr val="dk1"/>
                 </a:solidFill>
@@ -2575,7 +2664,7 @@
               </a:rPr>
               <a:t>Fünfte Ebene</a:t>
             </a:r>
-            <a:endParaRPr b="0" lang="en-US" sz="1950" strike="noStrike" u="none">
+            <a:endParaRPr lang="en-US" sz="1950" b="0" u="none" strike="noStrike">
               <a:solidFill>
                 <a:schemeClr val="dk1"/>
               </a:solidFill>
@@ -2610,7 +2699,7 @@
           </a:ln>
         </p:spPr>
         <p:txBody>
-          <a:bodyPr lIns="91440" rIns="91440" tIns="45720" bIns="45720" anchor="ctr">
+          <a:bodyPr lIns="91440" tIns="45720" rIns="91440" bIns="45720" anchor="ctr">
             <a:noAutofit/>
           </a:bodyPr>
           <a:lstStyle>
@@ -2619,7 +2708,7 @@
                 <a:spcPct val="100000"/>
               </a:lnSpc>
               <a:buNone/>
-              <a:defRPr b="0" lang="de-DE" sz="1300" strike="noStrike" u="none">
+              <a:defRPr lang="de-DE" sz="1300" b="0" u="none" strike="noStrike">
                 <a:solidFill>
                   <a:schemeClr val="dk1">
                     <a:tint val="82000"/>
@@ -2639,7 +2728,7 @@
               <a:buNone/>
             </a:pPr>
             <a:r>
-              <a:rPr b="0" lang="de-DE" sz="1300" strike="noStrike" u="none">
+              <a:rPr lang="de-DE" sz="1300" b="0" u="none" strike="noStrike">
                 <a:solidFill>
                   <a:schemeClr val="dk1">
                     <a:tint val="82000"/>
@@ -2651,7 +2740,7 @@
               </a:rPr>
               <a:t>&lt;date/time&gt;</a:t>
             </a:r>
-            <a:endParaRPr b="0" lang="en-US" sz="1300" strike="noStrike" u="none">
+            <a:endParaRPr lang="en-US" sz="1300" b="0" u="none" strike="noStrike">
               <a:solidFill>
                 <a:srgbClr val="000000"/>
               </a:solidFill>
@@ -2686,13 +2775,13 @@
           </a:ln>
         </p:spPr>
         <p:txBody>
-          <a:bodyPr lIns="91440" rIns="91440" tIns="45720" bIns="45720" anchor="ctr">
+          <a:bodyPr lIns="91440" tIns="45720" rIns="91440" bIns="45720" anchor="ctr">
             <a:noAutofit/>
           </a:bodyPr>
           <a:lstStyle>
             <a:lvl1pPr indent="0" algn="ctr">
               <a:buNone/>
-              <a:defRPr b="0" lang="en-US" sz="1400" strike="noStrike" u="none">
+              <a:defRPr lang="en-US" sz="1400" b="0" u="none" strike="noStrike">
                 <a:solidFill>
                   <a:srgbClr val="000000"/>
                 </a:solidFill>
@@ -2707,7 +2796,7 @@
               <a:buNone/>
             </a:pPr>
             <a:r>
-              <a:rPr b="0" lang="en-US" sz="1400" strike="noStrike" u="none">
+              <a:rPr lang="en-US" sz="1400" b="0" u="none" strike="noStrike">
                 <a:solidFill>
                   <a:srgbClr val="000000"/>
                 </a:solidFill>
@@ -2717,14 +2806,6 @@
               </a:rPr>
               <a:t>&lt;footer&gt;</a:t>
             </a:r>
-            <a:endParaRPr b="0" lang="en-US" sz="1400" strike="noStrike" u="none">
-              <a:solidFill>
-                <a:srgbClr val="000000"/>
-              </a:solidFill>
-              <a:effectLst/>
-              <a:uFillTx/>
-              <a:latin typeface="Times New Roman"/>
-            </a:endParaRPr>
           </a:p>
         </p:txBody>
       </p:sp>
@@ -2752,7 +2833,7 @@
           </a:ln>
         </p:spPr>
         <p:txBody>
-          <a:bodyPr lIns="91440" rIns="91440" tIns="45720" bIns="45720" anchor="ctr">
+          <a:bodyPr lIns="91440" tIns="45720" rIns="91440" bIns="45720" anchor="ctr">
             <a:noAutofit/>
           </a:bodyPr>
           <a:lstStyle>
@@ -2761,7 +2842,7 @@
                 <a:spcPct val="100000"/>
               </a:lnSpc>
               <a:buNone/>
-              <a:defRPr b="0" lang="de-DE" sz="1300" strike="noStrike" u="none">
+              <a:defRPr lang="de-DE" sz="1300" b="0" u="none" strike="noStrike">
                 <a:solidFill>
                   <a:schemeClr val="dk1">
                     <a:tint val="82000"/>
@@ -2781,7 +2862,7 @@
               <a:buNone/>
             </a:pPr>
             <a:fld id="{220A5E92-5FFB-4223-952B-D6DC419A2CBD}" type="slidenum">
-              <a:rPr b="0" lang="de-DE" sz="1300" strike="noStrike" u="none">
+              <a:rPr lang="de-DE" sz="1300" b="0" u="none" strike="noStrike">
                 <a:solidFill>
                   <a:schemeClr val="dk1">
                     <a:tint val="82000"/>
@@ -2791,9 +2872,9 @@
                 <a:uFillTx/>
                 <a:latin typeface="Aptos"/>
               </a:rPr>
-              <a:t>&lt;number&gt;</a:t>
+              <a:t>‹Nr.›</a:t>
             </a:fld>
-            <a:endParaRPr b="0" lang="en-US" sz="1300" strike="noStrike" u="none">
+            <a:endParaRPr lang="en-US" sz="1300" b="0" u="none" strike="noStrike">
               <a:solidFill>
                 <a:srgbClr val="000000"/>
               </a:solidFill>
@@ -2806,17 +2887,21 @@
       </p:sp>
     </p:spTree>
   </p:cSld>
+  <p:clrMapOvr>
+    <a:masterClrMapping/>
+  </p:clrMapOvr>
 </p:sldLayout>
 </file>
 
 <file path=ppt/slideLayouts/slideLayout5.xml><?xml version="1.0" encoding="utf-8"?>
-<p:sldLayout xmlns:a="http://schemas.openxmlformats.org/drawingml/2006/main" xmlns:p="http://schemas.openxmlformats.org/presentationml/2006/main" xmlns:r="http://schemas.openxmlformats.org/officeDocument/2006/relationships" xmlns:p14="http://schemas.microsoft.com/office/powerpoint/2010/main" xmlns:p15="http://schemas.microsoft.com/office/powerpoint/2012/main" xmlns:mc="http://schemas.openxmlformats.org/markup-compatibility/2006" type="blank" preserve="1">
+<p:sldLayout xmlns:a="http://schemas.openxmlformats.org/drawingml/2006/main" xmlns:r="http://schemas.openxmlformats.org/officeDocument/2006/relationships" xmlns:p="http://schemas.openxmlformats.org/presentationml/2006/main" type="blank" preserve="1">
   <p:cSld name="Abschnitts-&#10;überschrift">
     <p:bg>
       <p:bgPr>
         <a:solidFill>
-          <a:srgbClr val="ffffff"/>
+          <a:srgbClr val="FFFFFF"/>
         </a:solidFill>
+        <a:effectLst/>
       </p:bgPr>
     </p:bg>
     <p:spTree>
@@ -2857,9 +2942,10 @@
           </a:ln>
         </p:spPr>
         <p:txBody>
-          <a:bodyPr lIns="91440" rIns="91440" tIns="45720" bIns="45720" anchor="b">
+          <a:bodyPr lIns="91440" tIns="45720" rIns="91440" bIns="45720" anchor="b">
             <a:noAutofit/>
           </a:bodyPr>
+          <a:lstStyle/>
           <a:p>
             <a:pPr indent="0" defTabSz="990720">
               <a:lnSpc>
@@ -2868,7 +2954,7 @@
               <a:buNone/>
             </a:pPr>
             <a:r>
-              <a:rPr b="0" lang="de-DE" sz="6500" strike="noStrike" u="none">
+              <a:rPr lang="de-DE" sz="6500" b="0" u="none" strike="noStrike">
                 <a:solidFill>
                   <a:schemeClr val="dk1"/>
                 </a:solidFill>
@@ -2878,7 +2964,7 @@
               </a:rPr>
               <a:t>Mastertitelformat bearbeiten</a:t>
             </a:r>
-            <a:endParaRPr b="0" lang="en-US" sz="6500" strike="noStrike" u="none">
+            <a:endParaRPr lang="en-US" sz="6500" b="0" u="none" strike="noStrike">
               <a:solidFill>
                 <a:schemeClr val="dk1"/>
               </a:solidFill>
@@ -2913,9 +2999,10 @@
           </a:ln>
         </p:spPr>
         <p:txBody>
-          <a:bodyPr lIns="91440" rIns="91440" tIns="45720" bIns="45720" anchor="t">
+          <a:bodyPr lIns="91440" tIns="45720" rIns="91440" bIns="45720" anchor="t">
             <a:noAutofit/>
           </a:bodyPr>
+          <a:lstStyle/>
           <a:p>
             <a:pPr indent="0" defTabSz="990720">
               <a:lnSpc>
@@ -2926,11 +3013,11 @@
               </a:spcBef>
               <a:buNone/>
               <a:tabLst>
-                <a:tab algn="l" pos="0"/>
+                <a:tab pos="0" algn="l"/>
               </a:tabLst>
             </a:pPr>
             <a:r>
-              <a:rPr b="0" lang="de-DE" sz="2600" strike="noStrike" u="none">
+              <a:rPr lang="de-DE" sz="2600" b="0" u="none" strike="noStrike">
                 <a:solidFill>
                   <a:schemeClr val="dk1">
                     <a:tint val="82000"/>
@@ -2942,7 +3029,7 @@
               </a:rPr>
               <a:t>Mastertextformat bearbeiten</a:t>
             </a:r>
-            <a:endParaRPr b="0" lang="en-US" sz="2600" strike="noStrike" u="none">
+            <a:endParaRPr lang="en-US" sz="2600" b="0" u="none" strike="noStrike">
               <a:solidFill>
                 <a:schemeClr val="dk1"/>
               </a:solidFill>
@@ -2977,7 +3064,7 @@
           </a:ln>
         </p:spPr>
         <p:txBody>
-          <a:bodyPr lIns="91440" rIns="91440" tIns="45720" bIns="45720" anchor="ctr">
+          <a:bodyPr lIns="91440" tIns="45720" rIns="91440" bIns="45720" anchor="ctr">
             <a:noAutofit/>
           </a:bodyPr>
           <a:lstStyle>
@@ -2986,7 +3073,7 @@
                 <a:spcPct val="100000"/>
               </a:lnSpc>
               <a:buNone/>
-              <a:defRPr b="0" lang="de-DE" sz="1300" strike="noStrike" u="none">
+              <a:defRPr lang="de-DE" sz="1300" b="0" u="none" strike="noStrike">
                 <a:solidFill>
                   <a:schemeClr val="dk1">
                     <a:tint val="82000"/>
@@ -3006,7 +3093,7 @@
               <a:buNone/>
             </a:pPr>
             <a:r>
-              <a:rPr b="0" lang="de-DE" sz="1300" strike="noStrike" u="none">
+              <a:rPr lang="de-DE" sz="1300" b="0" u="none" strike="noStrike">
                 <a:solidFill>
                   <a:schemeClr val="dk1">
                     <a:tint val="82000"/>
@@ -3018,7 +3105,7 @@
               </a:rPr>
               <a:t>&lt;date/time&gt;</a:t>
             </a:r>
-            <a:endParaRPr b="0" lang="en-US" sz="1300" strike="noStrike" u="none">
+            <a:endParaRPr lang="en-US" sz="1300" b="0" u="none" strike="noStrike">
               <a:solidFill>
                 <a:srgbClr val="000000"/>
               </a:solidFill>
@@ -3053,13 +3140,13 @@
           </a:ln>
         </p:spPr>
         <p:txBody>
-          <a:bodyPr lIns="91440" rIns="91440" tIns="45720" bIns="45720" anchor="ctr">
+          <a:bodyPr lIns="91440" tIns="45720" rIns="91440" bIns="45720" anchor="ctr">
             <a:noAutofit/>
           </a:bodyPr>
           <a:lstStyle>
             <a:lvl1pPr indent="0" algn="ctr">
               <a:buNone/>
-              <a:defRPr b="0" lang="en-US" sz="1400" strike="noStrike" u="none">
+              <a:defRPr lang="en-US" sz="1400" b="0" u="none" strike="noStrike">
                 <a:solidFill>
                   <a:srgbClr val="000000"/>
                 </a:solidFill>
@@ -3074,7 +3161,7 @@
               <a:buNone/>
             </a:pPr>
             <a:r>
-              <a:rPr b="0" lang="en-US" sz="1400" strike="noStrike" u="none">
+              <a:rPr lang="en-US" sz="1400" b="0" u="none" strike="noStrike">
                 <a:solidFill>
                   <a:srgbClr val="000000"/>
                 </a:solidFill>
@@ -3084,14 +3171,6 @@
               </a:rPr>
               <a:t>&lt;footer&gt;</a:t>
             </a:r>
-            <a:endParaRPr b="0" lang="en-US" sz="1400" strike="noStrike" u="none">
-              <a:solidFill>
-                <a:srgbClr val="000000"/>
-              </a:solidFill>
-              <a:effectLst/>
-              <a:uFillTx/>
-              <a:latin typeface="Times New Roman"/>
-            </a:endParaRPr>
           </a:p>
         </p:txBody>
       </p:sp>
@@ -3119,7 +3198,7 @@
           </a:ln>
         </p:spPr>
         <p:txBody>
-          <a:bodyPr lIns="91440" rIns="91440" tIns="45720" bIns="45720" anchor="ctr">
+          <a:bodyPr lIns="91440" tIns="45720" rIns="91440" bIns="45720" anchor="ctr">
             <a:noAutofit/>
           </a:bodyPr>
           <a:lstStyle>
@@ -3128,7 +3207,7 @@
                 <a:spcPct val="100000"/>
               </a:lnSpc>
               <a:buNone/>
-              <a:defRPr b="0" lang="de-DE" sz="1300" strike="noStrike" u="none">
+              <a:defRPr lang="de-DE" sz="1300" b="0" u="none" strike="noStrike">
                 <a:solidFill>
                   <a:schemeClr val="dk1">
                     <a:tint val="82000"/>
@@ -3148,7 +3227,7 @@
               <a:buNone/>
             </a:pPr>
             <a:fld id="{70E766DE-0CD0-4982-BAA9-006AB2CFDBD1}" type="slidenum">
-              <a:rPr b="0" lang="de-DE" sz="1300" strike="noStrike" u="none">
+              <a:rPr lang="de-DE" sz="1300" b="0" u="none" strike="noStrike">
                 <a:solidFill>
                   <a:schemeClr val="dk1">
                     <a:tint val="82000"/>
@@ -3158,9 +3237,9 @@
                 <a:uFillTx/>
                 <a:latin typeface="Aptos"/>
               </a:rPr>
-              <a:t>&lt;number&gt;</a:t>
+              <a:t>‹Nr.›</a:t>
             </a:fld>
-            <a:endParaRPr b="0" lang="en-US" sz="1300" strike="noStrike" u="none">
+            <a:endParaRPr lang="en-US" sz="1300" b="0" u="none" strike="noStrike">
               <a:solidFill>
                 <a:srgbClr val="000000"/>
               </a:solidFill>
@@ -3173,17 +3252,21 @@
       </p:sp>
     </p:spTree>
   </p:cSld>
+  <p:clrMapOvr>
+    <a:masterClrMapping/>
+  </p:clrMapOvr>
 </p:sldLayout>
 </file>
 
 <file path=ppt/slideLayouts/slideLayout6.xml><?xml version="1.0" encoding="utf-8"?>
-<p:sldLayout xmlns:a="http://schemas.openxmlformats.org/drawingml/2006/main" xmlns:p="http://schemas.openxmlformats.org/presentationml/2006/main" xmlns:r="http://schemas.openxmlformats.org/officeDocument/2006/relationships" xmlns:p14="http://schemas.microsoft.com/office/powerpoint/2010/main" xmlns:p15="http://schemas.microsoft.com/office/powerpoint/2012/main" xmlns:mc="http://schemas.openxmlformats.org/markup-compatibility/2006" type="twoObj" preserve="1">
+<p:sldLayout xmlns:a="http://schemas.openxmlformats.org/drawingml/2006/main" xmlns:r="http://schemas.openxmlformats.org/officeDocument/2006/relationships" xmlns:p="http://schemas.openxmlformats.org/presentationml/2006/main" type="twoObj" preserve="1">
   <p:cSld name="Zwei Inhalte">
     <p:bg>
       <p:bgPr>
         <a:solidFill>
-          <a:srgbClr val="ffffff"/>
+          <a:srgbClr val="FFFFFF"/>
         </a:solidFill>
+        <a:effectLst/>
       </p:bgPr>
     </p:bg>
     <p:spTree>
@@ -3224,9 +3307,10 @@
           </a:ln>
         </p:spPr>
         <p:txBody>
-          <a:bodyPr lIns="91440" rIns="91440" tIns="45720" bIns="45720" anchor="ctr">
+          <a:bodyPr lIns="91440" tIns="45720" rIns="91440" bIns="45720" anchor="ctr">
             <a:noAutofit/>
           </a:bodyPr>
+          <a:lstStyle/>
           <a:p>
             <a:pPr indent="0" defTabSz="990720">
               <a:lnSpc>
@@ -3235,7 +3319,7 @@
               <a:buNone/>
             </a:pPr>
             <a:r>
-              <a:rPr b="0" lang="de-DE" sz="4770" strike="noStrike" u="none">
+              <a:rPr lang="de-DE" sz="4770" b="0" u="none" strike="noStrike">
                 <a:solidFill>
                   <a:schemeClr val="dk1"/>
                 </a:solidFill>
@@ -3245,7 +3329,7 @@
               </a:rPr>
               <a:t>Mastertitelformat bearbeiten</a:t>
             </a:r>
-            <a:endParaRPr b="0" lang="en-US" sz="4770" strike="noStrike" u="none">
+            <a:endParaRPr lang="en-US" sz="4770" b="0" u="none" strike="noStrike">
               <a:solidFill>
                 <a:schemeClr val="dk1"/>
               </a:solidFill>
@@ -3280,9 +3364,10 @@
           </a:ln>
         </p:spPr>
         <p:txBody>
-          <a:bodyPr lIns="91440" rIns="91440" tIns="45720" bIns="45720" anchor="t">
+          <a:bodyPr lIns="91440" tIns="45720" rIns="91440" bIns="45720" anchor="t">
             <a:noAutofit/>
           </a:bodyPr>
+          <a:lstStyle/>
           <a:p>
             <a:pPr marL="247680" indent="-247680" defTabSz="990720">
               <a:lnSpc>
@@ -3298,7 +3383,7 @@
               <a:buChar char="•"/>
             </a:pPr>
             <a:r>
-              <a:rPr b="0" lang="de-DE" sz="3040" strike="noStrike" u="none">
+              <a:rPr lang="de-DE" sz="3040" b="0" u="none" strike="noStrike">
                 <a:solidFill>
                   <a:schemeClr val="dk1"/>
                 </a:solidFill>
@@ -3308,7 +3393,7 @@
               </a:rPr>
               <a:t>Mastertextformat bearbeiten</a:t>
             </a:r>
-            <a:endParaRPr b="0" lang="en-US" sz="3040" strike="noStrike" u="none">
+            <a:endParaRPr lang="en-US" sz="3040" b="0" u="none" strike="noStrike">
               <a:solidFill>
                 <a:schemeClr val="dk1"/>
               </a:solidFill>
@@ -3318,7 +3403,7 @@
             </a:endParaRPr>
           </a:p>
           <a:p>
-            <a:pPr lvl="1" marL="743040" indent="-247680" defTabSz="990720">
+            <a:pPr marL="743040" lvl="1" indent="-247680" defTabSz="990720">
               <a:lnSpc>
                 <a:spcPct val="90000"/>
               </a:lnSpc>
@@ -3332,7 +3417,7 @@
               <a:buChar char="•"/>
             </a:pPr>
             <a:r>
-              <a:rPr b="0" lang="de-DE" sz="2600" strike="noStrike" u="none">
+              <a:rPr lang="de-DE" sz="2600" b="0" u="none" strike="noStrike">
                 <a:solidFill>
                   <a:schemeClr val="dk1"/>
                 </a:solidFill>
@@ -3342,7 +3427,7 @@
               </a:rPr>
               <a:t>Zweite Ebene</a:t>
             </a:r>
-            <a:endParaRPr b="0" lang="en-US" sz="2600" strike="noStrike" u="none">
+            <a:endParaRPr lang="en-US" sz="2600" b="0" u="none" strike="noStrike">
               <a:solidFill>
                 <a:schemeClr val="dk1"/>
               </a:solidFill>
@@ -3352,7 +3437,7 @@
             </a:endParaRPr>
           </a:p>
           <a:p>
-            <a:pPr lvl="2" marL="1238040" indent="-247680" defTabSz="990720">
+            <a:pPr marL="1238040" lvl="2" indent="-247680" defTabSz="990720">
               <a:lnSpc>
                 <a:spcPct val="90000"/>
               </a:lnSpc>
@@ -3366,7 +3451,7 @@
               <a:buChar char="•"/>
             </a:pPr>
             <a:r>
-              <a:rPr b="0" lang="de-DE" sz="2170" strike="noStrike" u="none">
+              <a:rPr lang="de-DE" sz="2170" b="0" u="none" strike="noStrike">
                 <a:solidFill>
                   <a:schemeClr val="dk1"/>
                 </a:solidFill>
@@ -3376,7 +3461,7 @@
               </a:rPr>
               <a:t>Dritte Ebene</a:t>
             </a:r>
-            <a:endParaRPr b="0" lang="en-US" sz="2170" strike="noStrike" u="none">
+            <a:endParaRPr lang="en-US" sz="2170" b="0" u="none" strike="noStrike">
               <a:solidFill>
                 <a:schemeClr val="dk1"/>
               </a:solidFill>
@@ -3386,7 +3471,7 @@
             </a:endParaRPr>
           </a:p>
           <a:p>
-            <a:pPr lvl="3" marL="1733400" indent="-247680" defTabSz="990720">
+            <a:pPr marL="1733400" lvl="3" indent="-247680" defTabSz="990720">
               <a:lnSpc>
                 <a:spcPct val="90000"/>
               </a:lnSpc>
@@ -3400,7 +3485,7 @@
               <a:buChar char="•"/>
             </a:pPr>
             <a:r>
-              <a:rPr b="0" lang="de-DE" sz="1950" strike="noStrike" u="none">
+              <a:rPr lang="de-DE" sz="1950" b="0" u="none" strike="noStrike">
                 <a:solidFill>
                   <a:schemeClr val="dk1"/>
                 </a:solidFill>
@@ -3410,7 +3495,7 @@
               </a:rPr>
               <a:t>Vierte Ebene</a:t>
             </a:r>
-            <a:endParaRPr b="0" lang="en-US" sz="1950" strike="noStrike" u="none">
+            <a:endParaRPr lang="en-US" sz="1950" b="0" u="none" strike="noStrike">
               <a:solidFill>
                 <a:schemeClr val="dk1"/>
               </a:solidFill>
@@ -3420,7 +3505,7 @@
             </a:endParaRPr>
           </a:p>
           <a:p>
-            <a:pPr lvl="4" marL="2228760" indent="-247680" defTabSz="990720">
+            <a:pPr marL="2228760" lvl="4" indent="-247680" defTabSz="990720">
               <a:lnSpc>
                 <a:spcPct val="90000"/>
               </a:lnSpc>
@@ -3434,7 +3519,7 @@
               <a:buChar char="•"/>
             </a:pPr>
             <a:r>
-              <a:rPr b="0" lang="de-DE" sz="1950" strike="noStrike" u="none">
+              <a:rPr lang="de-DE" sz="1950" b="0" u="none" strike="noStrike">
                 <a:solidFill>
                   <a:schemeClr val="dk1"/>
                 </a:solidFill>
@@ -3444,7 +3529,7 @@
               </a:rPr>
               <a:t>Fünfte Ebene</a:t>
             </a:r>
-            <a:endParaRPr b="0" lang="en-US" sz="1950" strike="noStrike" u="none">
+            <a:endParaRPr lang="en-US" sz="1950" b="0" u="none" strike="noStrike">
               <a:solidFill>
                 <a:schemeClr val="dk1"/>
               </a:solidFill>
@@ -3479,9 +3564,10 @@
           </a:ln>
         </p:spPr>
         <p:txBody>
-          <a:bodyPr lIns="91440" rIns="91440" tIns="45720" bIns="45720" anchor="t">
+          <a:bodyPr lIns="91440" tIns="45720" rIns="91440" bIns="45720" anchor="t">
             <a:noAutofit/>
           </a:bodyPr>
+          <a:lstStyle/>
           <a:p>
             <a:pPr marL="247680" indent="-247680" defTabSz="990720">
               <a:lnSpc>
@@ -3497,7 +3583,7 @@
               <a:buChar char="•"/>
             </a:pPr>
             <a:r>
-              <a:rPr b="0" lang="de-DE" sz="3040" strike="noStrike" u="none">
+              <a:rPr lang="de-DE" sz="3040" b="0" u="none" strike="noStrike">
                 <a:solidFill>
                   <a:schemeClr val="dk1"/>
                 </a:solidFill>
@@ -3507,7 +3593,7 @@
               </a:rPr>
               <a:t>Mastertextformat bearbeiten</a:t>
             </a:r>
-            <a:endParaRPr b="0" lang="en-US" sz="3040" strike="noStrike" u="none">
+            <a:endParaRPr lang="en-US" sz="3040" b="0" u="none" strike="noStrike">
               <a:solidFill>
                 <a:schemeClr val="dk1"/>
               </a:solidFill>
@@ -3517,7 +3603,7 @@
             </a:endParaRPr>
           </a:p>
           <a:p>
-            <a:pPr lvl="1" marL="743040" indent="-247680" defTabSz="990720">
+            <a:pPr marL="743040" lvl="1" indent="-247680" defTabSz="990720">
               <a:lnSpc>
                 <a:spcPct val="90000"/>
               </a:lnSpc>
@@ -3531,7 +3617,7 @@
               <a:buChar char="•"/>
             </a:pPr>
             <a:r>
-              <a:rPr b="0" lang="de-DE" sz="2600" strike="noStrike" u="none">
+              <a:rPr lang="de-DE" sz="2600" b="0" u="none" strike="noStrike">
                 <a:solidFill>
                   <a:schemeClr val="dk1"/>
                 </a:solidFill>
@@ -3541,7 +3627,7 @@
               </a:rPr>
               <a:t>Zweite Ebene</a:t>
             </a:r>
-            <a:endParaRPr b="0" lang="en-US" sz="2600" strike="noStrike" u="none">
+            <a:endParaRPr lang="en-US" sz="2600" b="0" u="none" strike="noStrike">
               <a:solidFill>
                 <a:schemeClr val="dk1"/>
               </a:solidFill>
@@ -3551,7 +3637,7 @@
             </a:endParaRPr>
           </a:p>
           <a:p>
-            <a:pPr lvl="2" marL="1238040" indent="-247680" defTabSz="990720">
+            <a:pPr marL="1238040" lvl="2" indent="-247680" defTabSz="990720">
               <a:lnSpc>
                 <a:spcPct val="90000"/>
               </a:lnSpc>
@@ -3565,7 +3651,7 @@
               <a:buChar char="•"/>
             </a:pPr>
             <a:r>
-              <a:rPr b="0" lang="de-DE" sz="2170" strike="noStrike" u="none">
+              <a:rPr lang="de-DE" sz="2170" b="0" u="none" strike="noStrike">
                 <a:solidFill>
                   <a:schemeClr val="dk1"/>
                 </a:solidFill>
@@ -3575,7 +3661,7 @@
               </a:rPr>
               <a:t>Dritte Ebene</a:t>
             </a:r>
-            <a:endParaRPr b="0" lang="en-US" sz="2170" strike="noStrike" u="none">
+            <a:endParaRPr lang="en-US" sz="2170" b="0" u="none" strike="noStrike">
               <a:solidFill>
                 <a:schemeClr val="dk1"/>
               </a:solidFill>
@@ -3585,7 +3671,7 @@
             </a:endParaRPr>
           </a:p>
           <a:p>
-            <a:pPr lvl="3" marL="1733400" indent="-247680" defTabSz="990720">
+            <a:pPr marL="1733400" lvl="3" indent="-247680" defTabSz="990720">
               <a:lnSpc>
                 <a:spcPct val="90000"/>
               </a:lnSpc>
@@ -3599,7 +3685,7 @@
               <a:buChar char="•"/>
             </a:pPr>
             <a:r>
-              <a:rPr b="0" lang="de-DE" sz="1950" strike="noStrike" u="none">
+              <a:rPr lang="de-DE" sz="1950" b="0" u="none" strike="noStrike">
                 <a:solidFill>
                   <a:schemeClr val="dk1"/>
                 </a:solidFill>
@@ -3609,7 +3695,7 @@
               </a:rPr>
               <a:t>Vierte Ebene</a:t>
             </a:r>
-            <a:endParaRPr b="0" lang="en-US" sz="1950" strike="noStrike" u="none">
+            <a:endParaRPr lang="en-US" sz="1950" b="0" u="none" strike="noStrike">
               <a:solidFill>
                 <a:schemeClr val="dk1"/>
               </a:solidFill>
@@ -3619,7 +3705,7 @@
             </a:endParaRPr>
           </a:p>
           <a:p>
-            <a:pPr lvl="4" marL="2228760" indent="-247680" defTabSz="990720">
+            <a:pPr marL="2228760" lvl="4" indent="-247680" defTabSz="990720">
               <a:lnSpc>
                 <a:spcPct val="90000"/>
               </a:lnSpc>
@@ -3633,7 +3719,7 @@
               <a:buChar char="•"/>
             </a:pPr>
             <a:r>
-              <a:rPr b="0" lang="de-DE" sz="1950" strike="noStrike" u="none">
+              <a:rPr lang="de-DE" sz="1950" b="0" u="none" strike="noStrike">
                 <a:solidFill>
                   <a:schemeClr val="dk1"/>
                 </a:solidFill>
@@ -3643,7 +3729,7 @@
               </a:rPr>
               <a:t>Fünfte Ebene</a:t>
             </a:r>
-            <a:endParaRPr b="0" lang="en-US" sz="1950" strike="noStrike" u="none">
+            <a:endParaRPr lang="en-US" sz="1950" b="0" u="none" strike="noStrike">
               <a:solidFill>
                 <a:schemeClr val="dk1"/>
               </a:solidFill>
@@ -3678,7 +3764,7 @@
           </a:ln>
         </p:spPr>
         <p:txBody>
-          <a:bodyPr lIns="91440" rIns="91440" tIns="45720" bIns="45720" anchor="ctr">
+          <a:bodyPr lIns="91440" tIns="45720" rIns="91440" bIns="45720" anchor="ctr">
             <a:noAutofit/>
           </a:bodyPr>
           <a:lstStyle>
@@ -3687,7 +3773,7 @@
                 <a:spcPct val="100000"/>
               </a:lnSpc>
               <a:buNone/>
-              <a:defRPr b="0" lang="de-DE" sz="1300" strike="noStrike" u="none">
+              <a:defRPr lang="de-DE" sz="1300" b="0" u="none" strike="noStrike">
                 <a:solidFill>
                   <a:schemeClr val="dk1">
                     <a:tint val="82000"/>
@@ -3707,7 +3793,7 @@
               <a:buNone/>
             </a:pPr>
             <a:r>
-              <a:rPr b="0" lang="de-DE" sz="1300" strike="noStrike" u="none">
+              <a:rPr lang="de-DE" sz="1300" b="0" u="none" strike="noStrike">
                 <a:solidFill>
                   <a:schemeClr val="dk1">
                     <a:tint val="82000"/>
@@ -3719,7 +3805,7 @@
               </a:rPr>
               <a:t>&lt;date/time&gt;</a:t>
             </a:r>
-            <a:endParaRPr b="0" lang="en-US" sz="1300" strike="noStrike" u="none">
+            <a:endParaRPr lang="en-US" sz="1300" b="0" u="none" strike="noStrike">
               <a:solidFill>
                 <a:srgbClr val="000000"/>
               </a:solidFill>
@@ -3754,13 +3840,13 @@
           </a:ln>
         </p:spPr>
         <p:txBody>
-          <a:bodyPr lIns="91440" rIns="91440" tIns="45720" bIns="45720" anchor="ctr">
+          <a:bodyPr lIns="91440" tIns="45720" rIns="91440" bIns="45720" anchor="ctr">
             <a:noAutofit/>
           </a:bodyPr>
           <a:lstStyle>
             <a:lvl1pPr indent="0" algn="ctr">
               <a:buNone/>
-              <a:defRPr b="0" lang="en-US" sz="1400" strike="noStrike" u="none">
+              <a:defRPr lang="en-US" sz="1400" b="0" u="none" strike="noStrike">
                 <a:solidFill>
                   <a:srgbClr val="000000"/>
                 </a:solidFill>
@@ -3775,7 +3861,7 @@
               <a:buNone/>
             </a:pPr>
             <a:r>
-              <a:rPr b="0" lang="en-US" sz="1400" strike="noStrike" u="none">
+              <a:rPr lang="en-US" sz="1400" b="0" u="none" strike="noStrike">
                 <a:solidFill>
                   <a:srgbClr val="000000"/>
                 </a:solidFill>
@@ -3785,14 +3871,6 @@
               </a:rPr>
               <a:t>&lt;footer&gt;</a:t>
             </a:r>
-            <a:endParaRPr b="0" lang="en-US" sz="1400" strike="noStrike" u="none">
-              <a:solidFill>
-                <a:srgbClr val="000000"/>
-              </a:solidFill>
-              <a:effectLst/>
-              <a:uFillTx/>
-              <a:latin typeface="Times New Roman"/>
-            </a:endParaRPr>
           </a:p>
         </p:txBody>
       </p:sp>
@@ -3820,7 +3898,7 @@
           </a:ln>
         </p:spPr>
         <p:txBody>
-          <a:bodyPr lIns="91440" rIns="91440" tIns="45720" bIns="45720" anchor="ctr">
+          <a:bodyPr lIns="91440" tIns="45720" rIns="91440" bIns="45720" anchor="ctr">
             <a:noAutofit/>
           </a:bodyPr>
           <a:lstStyle>
@@ -3829,7 +3907,7 @@
                 <a:spcPct val="100000"/>
               </a:lnSpc>
               <a:buNone/>
-              <a:defRPr b="0" lang="de-DE" sz="1300" strike="noStrike" u="none">
+              <a:defRPr lang="de-DE" sz="1300" b="0" u="none" strike="noStrike">
                 <a:solidFill>
                   <a:schemeClr val="dk1">
                     <a:tint val="82000"/>
@@ -3849,7 +3927,7 @@
               <a:buNone/>
             </a:pPr>
             <a:fld id="{216DDDD6-6CC7-4CAA-9A9B-72CF8FBFAE55}" type="slidenum">
-              <a:rPr b="0" lang="de-DE" sz="1300" strike="noStrike" u="none">
+              <a:rPr lang="de-DE" sz="1300" b="0" u="none" strike="noStrike">
                 <a:solidFill>
                   <a:schemeClr val="dk1">
                     <a:tint val="82000"/>
@@ -3859,9 +3937,9 @@
                 <a:uFillTx/>
                 <a:latin typeface="Aptos"/>
               </a:rPr>
-              <a:t>&lt;number&gt;</a:t>
+              <a:t>‹Nr.›</a:t>
             </a:fld>
-            <a:endParaRPr b="0" lang="en-US" sz="1300" strike="noStrike" u="none">
+            <a:endParaRPr lang="en-US" sz="1300" b="0" u="none" strike="noStrike">
               <a:solidFill>
                 <a:srgbClr val="000000"/>
               </a:solidFill>
@@ -3874,17 +3952,21 @@
       </p:sp>
     </p:spTree>
   </p:cSld>
+  <p:clrMapOvr>
+    <a:masterClrMapping/>
+  </p:clrMapOvr>
 </p:sldLayout>
 </file>
 
 <file path=ppt/slideLayouts/slideLayout7.xml><?xml version="1.0" encoding="utf-8"?>
-<p:sldLayout xmlns:a="http://schemas.openxmlformats.org/drawingml/2006/main" xmlns:p="http://schemas.openxmlformats.org/presentationml/2006/main" xmlns:r="http://schemas.openxmlformats.org/officeDocument/2006/relationships" xmlns:p14="http://schemas.microsoft.com/office/powerpoint/2010/main" xmlns:p15="http://schemas.microsoft.com/office/powerpoint/2012/main" xmlns:mc="http://schemas.openxmlformats.org/markup-compatibility/2006" type="blank" preserve="1">
+<p:sldLayout xmlns:a="http://schemas.openxmlformats.org/drawingml/2006/main" xmlns:r="http://schemas.openxmlformats.org/officeDocument/2006/relationships" xmlns:p="http://schemas.openxmlformats.org/presentationml/2006/main" type="blank" preserve="1">
   <p:cSld name="Vergleich">
     <p:bg>
       <p:bgPr>
         <a:solidFill>
-          <a:srgbClr val="ffffff"/>
+          <a:srgbClr val="FFFFFF"/>
         </a:solidFill>
+        <a:effectLst/>
       </p:bgPr>
     </p:bg>
     <p:spTree>
@@ -3925,9 +4007,10 @@
           </a:ln>
         </p:spPr>
         <p:txBody>
-          <a:bodyPr lIns="91440" rIns="91440" tIns="45720" bIns="45720" anchor="ctr">
+          <a:bodyPr lIns="91440" tIns="45720" rIns="91440" bIns="45720" anchor="ctr">
             <a:noAutofit/>
           </a:bodyPr>
+          <a:lstStyle/>
           <a:p>
             <a:pPr indent="0" defTabSz="990720">
               <a:lnSpc>
@@ -3936,7 +4019,7 @@
               <a:buNone/>
             </a:pPr>
             <a:r>
-              <a:rPr b="0" lang="de-DE" sz="4770" strike="noStrike" u="none">
+              <a:rPr lang="de-DE" sz="4770" b="0" u="none" strike="noStrike">
                 <a:solidFill>
                   <a:schemeClr val="dk1"/>
                 </a:solidFill>
@@ -3946,7 +4029,7 @@
               </a:rPr>
               <a:t>Mastertitelformat bearbeiten</a:t>
             </a:r>
-            <a:endParaRPr b="0" lang="en-US" sz="4770" strike="noStrike" u="none">
+            <a:endParaRPr lang="en-US" sz="4770" b="0" u="none" strike="noStrike">
               <a:solidFill>
                 <a:schemeClr val="dk1"/>
               </a:solidFill>
@@ -3981,9 +4064,10 @@
           </a:ln>
         </p:spPr>
         <p:txBody>
-          <a:bodyPr lIns="91440" rIns="91440" tIns="45720" bIns="45720" anchor="b">
+          <a:bodyPr lIns="91440" tIns="45720" rIns="91440" bIns="45720" anchor="b">
             <a:noAutofit/>
           </a:bodyPr>
+          <a:lstStyle/>
           <a:p>
             <a:pPr indent="0" defTabSz="990720">
               <a:lnSpc>
@@ -3994,11 +4078,11 @@
               </a:spcBef>
               <a:buNone/>
               <a:tabLst>
-                <a:tab algn="l" pos="0"/>
+                <a:tab pos="0" algn="l"/>
               </a:tabLst>
             </a:pPr>
             <a:r>
-              <a:rPr b="1" lang="de-DE" sz="2600" strike="noStrike" u="none">
+              <a:rPr lang="de-DE" sz="2600" b="1" u="none" strike="noStrike">
                 <a:solidFill>
                   <a:schemeClr val="dk1"/>
                 </a:solidFill>
@@ -4008,7 +4092,7 @@
               </a:rPr>
               <a:t>Mastertextformat bearbeiten</a:t>
             </a:r>
-            <a:endParaRPr b="0" lang="en-US" sz="2600" strike="noStrike" u="none">
+            <a:endParaRPr lang="en-US" sz="2600" b="0" u="none" strike="noStrike">
               <a:solidFill>
                 <a:schemeClr val="dk1"/>
               </a:solidFill>
@@ -4043,9 +4127,10 @@
           </a:ln>
         </p:spPr>
         <p:txBody>
-          <a:bodyPr lIns="91440" rIns="91440" tIns="45720" bIns="45720" anchor="t">
+          <a:bodyPr lIns="91440" tIns="45720" rIns="91440" bIns="45720" anchor="t">
             <a:noAutofit/>
           </a:bodyPr>
+          <a:lstStyle/>
           <a:p>
             <a:pPr marL="247680" indent="-247680" defTabSz="990720">
               <a:lnSpc>
@@ -4061,7 +4146,7 @@
               <a:buChar char="•"/>
             </a:pPr>
             <a:r>
-              <a:rPr b="0" lang="de-DE" sz="3040" strike="noStrike" u="none">
+              <a:rPr lang="de-DE" sz="3040" b="0" u="none" strike="noStrike">
                 <a:solidFill>
                   <a:schemeClr val="dk1"/>
                 </a:solidFill>
@@ -4071,7 +4156,7 @@
               </a:rPr>
               <a:t>Mastertextformat bearbeiten</a:t>
             </a:r>
-            <a:endParaRPr b="0" lang="en-US" sz="3040" strike="noStrike" u="none">
+            <a:endParaRPr lang="en-US" sz="3040" b="0" u="none" strike="noStrike">
               <a:solidFill>
                 <a:schemeClr val="dk1"/>
               </a:solidFill>
@@ -4081,7 +4166,7 @@
             </a:endParaRPr>
           </a:p>
           <a:p>
-            <a:pPr lvl="1" marL="743040" indent="-247680" defTabSz="990720">
+            <a:pPr marL="743040" lvl="1" indent="-247680" defTabSz="990720">
               <a:lnSpc>
                 <a:spcPct val="90000"/>
               </a:lnSpc>
@@ -4095,7 +4180,7 @@
               <a:buChar char="•"/>
             </a:pPr>
             <a:r>
-              <a:rPr b="0" lang="de-DE" sz="2600" strike="noStrike" u="none">
+              <a:rPr lang="de-DE" sz="2600" b="0" u="none" strike="noStrike">
                 <a:solidFill>
                   <a:schemeClr val="dk1"/>
                 </a:solidFill>
@@ -4105,7 +4190,7 @@
               </a:rPr>
               <a:t>Zweite Ebene</a:t>
             </a:r>
-            <a:endParaRPr b="0" lang="en-US" sz="2600" strike="noStrike" u="none">
+            <a:endParaRPr lang="en-US" sz="2600" b="0" u="none" strike="noStrike">
               <a:solidFill>
                 <a:schemeClr val="dk1"/>
               </a:solidFill>
@@ -4115,7 +4200,7 @@
             </a:endParaRPr>
           </a:p>
           <a:p>
-            <a:pPr lvl="2" marL="1238040" indent="-247680" defTabSz="990720">
+            <a:pPr marL="1238040" lvl="2" indent="-247680" defTabSz="990720">
               <a:lnSpc>
                 <a:spcPct val="90000"/>
               </a:lnSpc>
@@ -4129,7 +4214,7 @@
               <a:buChar char="•"/>
             </a:pPr>
             <a:r>
-              <a:rPr b="0" lang="de-DE" sz="2170" strike="noStrike" u="none">
+              <a:rPr lang="de-DE" sz="2170" b="0" u="none" strike="noStrike">
                 <a:solidFill>
                   <a:schemeClr val="dk1"/>
                 </a:solidFill>
@@ -4139,7 +4224,7 @@
               </a:rPr>
               <a:t>Dritte Ebene</a:t>
             </a:r>
-            <a:endParaRPr b="0" lang="en-US" sz="2170" strike="noStrike" u="none">
+            <a:endParaRPr lang="en-US" sz="2170" b="0" u="none" strike="noStrike">
               <a:solidFill>
                 <a:schemeClr val="dk1"/>
               </a:solidFill>
@@ -4149,7 +4234,7 @@
             </a:endParaRPr>
           </a:p>
           <a:p>
-            <a:pPr lvl="3" marL="1733400" indent="-247680" defTabSz="990720">
+            <a:pPr marL="1733400" lvl="3" indent="-247680" defTabSz="990720">
               <a:lnSpc>
                 <a:spcPct val="90000"/>
               </a:lnSpc>
@@ -4163,7 +4248,7 @@
               <a:buChar char="•"/>
             </a:pPr>
             <a:r>
-              <a:rPr b="0" lang="de-DE" sz="1950" strike="noStrike" u="none">
+              <a:rPr lang="de-DE" sz="1950" b="0" u="none" strike="noStrike">
                 <a:solidFill>
                   <a:schemeClr val="dk1"/>
                 </a:solidFill>
@@ -4173,7 +4258,7 @@
               </a:rPr>
               <a:t>Vierte Ebene</a:t>
             </a:r>
-            <a:endParaRPr b="0" lang="en-US" sz="1950" strike="noStrike" u="none">
+            <a:endParaRPr lang="en-US" sz="1950" b="0" u="none" strike="noStrike">
               <a:solidFill>
                 <a:schemeClr val="dk1"/>
               </a:solidFill>
@@ -4183,7 +4268,7 @@
             </a:endParaRPr>
           </a:p>
           <a:p>
-            <a:pPr lvl="4" marL="2228760" indent="-247680" defTabSz="990720">
+            <a:pPr marL="2228760" lvl="4" indent="-247680" defTabSz="990720">
               <a:lnSpc>
                 <a:spcPct val="90000"/>
               </a:lnSpc>
@@ -4197,7 +4282,7 @@
               <a:buChar char="•"/>
             </a:pPr>
             <a:r>
-              <a:rPr b="0" lang="de-DE" sz="1950" strike="noStrike" u="none">
+              <a:rPr lang="de-DE" sz="1950" b="0" u="none" strike="noStrike">
                 <a:solidFill>
                   <a:schemeClr val="dk1"/>
                 </a:solidFill>
@@ -4207,7 +4292,7 @@
               </a:rPr>
               <a:t>Fünfte Ebene</a:t>
             </a:r>
-            <a:endParaRPr b="0" lang="en-US" sz="1950" strike="noStrike" u="none">
+            <a:endParaRPr lang="en-US" sz="1950" b="0" u="none" strike="noStrike">
               <a:solidFill>
                 <a:schemeClr val="dk1"/>
               </a:solidFill>
@@ -4242,9 +4327,10 @@
           </a:ln>
         </p:spPr>
         <p:txBody>
-          <a:bodyPr lIns="91440" rIns="91440" tIns="45720" bIns="45720" anchor="b">
+          <a:bodyPr lIns="91440" tIns="45720" rIns="91440" bIns="45720" anchor="b">
             <a:noAutofit/>
           </a:bodyPr>
+          <a:lstStyle/>
           <a:p>
             <a:pPr indent="0" defTabSz="990720">
               <a:lnSpc>
@@ -4255,11 +4341,11 @@
               </a:spcBef>
               <a:buNone/>
               <a:tabLst>
-                <a:tab algn="l" pos="0"/>
+                <a:tab pos="0" algn="l"/>
               </a:tabLst>
             </a:pPr>
             <a:r>
-              <a:rPr b="1" lang="de-DE" sz="2600" strike="noStrike" u="none">
+              <a:rPr lang="de-DE" sz="2600" b="1" u="none" strike="noStrike">
                 <a:solidFill>
                   <a:schemeClr val="dk1"/>
                 </a:solidFill>
@@ -4269,7 +4355,7 @@
               </a:rPr>
               <a:t>Mastertextformat bearbeiten</a:t>
             </a:r>
-            <a:endParaRPr b="0" lang="en-US" sz="2600" strike="noStrike" u="none">
+            <a:endParaRPr lang="en-US" sz="2600" b="0" u="none" strike="noStrike">
               <a:solidFill>
                 <a:schemeClr val="dk1"/>
               </a:solidFill>
@@ -4304,9 +4390,10 @@
           </a:ln>
         </p:spPr>
         <p:txBody>
-          <a:bodyPr lIns="91440" rIns="91440" tIns="45720" bIns="45720" anchor="t">
+          <a:bodyPr lIns="91440" tIns="45720" rIns="91440" bIns="45720" anchor="t">
             <a:noAutofit/>
           </a:bodyPr>
+          <a:lstStyle/>
           <a:p>
             <a:pPr marL="247680" indent="-247680" defTabSz="990720">
               <a:lnSpc>
@@ -4322,7 +4409,7 @@
               <a:buChar char="•"/>
             </a:pPr>
             <a:r>
-              <a:rPr b="0" lang="de-DE" sz="3040" strike="noStrike" u="none">
+              <a:rPr lang="de-DE" sz="3040" b="0" u="none" strike="noStrike">
                 <a:solidFill>
                   <a:schemeClr val="dk1"/>
                 </a:solidFill>
@@ -4332,7 +4419,7 @@
               </a:rPr>
               <a:t>Mastertextformat bearbeiten</a:t>
             </a:r>
-            <a:endParaRPr b="0" lang="en-US" sz="3040" strike="noStrike" u="none">
+            <a:endParaRPr lang="en-US" sz="3040" b="0" u="none" strike="noStrike">
               <a:solidFill>
                 <a:schemeClr val="dk1"/>
               </a:solidFill>
@@ -4342,7 +4429,7 @@
             </a:endParaRPr>
           </a:p>
           <a:p>
-            <a:pPr lvl="1" marL="743040" indent="-247680" defTabSz="990720">
+            <a:pPr marL="743040" lvl="1" indent="-247680" defTabSz="990720">
               <a:lnSpc>
                 <a:spcPct val="90000"/>
               </a:lnSpc>
@@ -4356,7 +4443,7 @@
               <a:buChar char="•"/>
             </a:pPr>
             <a:r>
-              <a:rPr b="0" lang="de-DE" sz="2600" strike="noStrike" u="none">
+              <a:rPr lang="de-DE" sz="2600" b="0" u="none" strike="noStrike">
                 <a:solidFill>
                   <a:schemeClr val="dk1"/>
                 </a:solidFill>
@@ -4366,7 +4453,7 @@
               </a:rPr>
               <a:t>Zweite Ebene</a:t>
             </a:r>
-            <a:endParaRPr b="0" lang="en-US" sz="2600" strike="noStrike" u="none">
+            <a:endParaRPr lang="en-US" sz="2600" b="0" u="none" strike="noStrike">
               <a:solidFill>
                 <a:schemeClr val="dk1"/>
               </a:solidFill>
@@ -4376,7 +4463,7 @@
             </a:endParaRPr>
           </a:p>
           <a:p>
-            <a:pPr lvl="2" marL="1238040" indent="-247680" defTabSz="990720">
+            <a:pPr marL="1238040" lvl="2" indent="-247680" defTabSz="990720">
               <a:lnSpc>
                 <a:spcPct val="90000"/>
               </a:lnSpc>
@@ -4390,7 +4477,7 @@
               <a:buChar char="•"/>
             </a:pPr>
             <a:r>
-              <a:rPr b="0" lang="de-DE" sz="2170" strike="noStrike" u="none">
+              <a:rPr lang="de-DE" sz="2170" b="0" u="none" strike="noStrike">
                 <a:solidFill>
                   <a:schemeClr val="dk1"/>
                 </a:solidFill>
@@ -4400,7 +4487,7 @@
               </a:rPr>
               <a:t>Dritte Ebene</a:t>
             </a:r>
-            <a:endParaRPr b="0" lang="en-US" sz="2170" strike="noStrike" u="none">
+            <a:endParaRPr lang="en-US" sz="2170" b="0" u="none" strike="noStrike">
               <a:solidFill>
                 <a:schemeClr val="dk1"/>
               </a:solidFill>
@@ -4410,7 +4497,7 @@
             </a:endParaRPr>
           </a:p>
           <a:p>
-            <a:pPr lvl="3" marL="1733400" indent="-247680" defTabSz="990720">
+            <a:pPr marL="1733400" lvl="3" indent="-247680" defTabSz="990720">
               <a:lnSpc>
                 <a:spcPct val="90000"/>
               </a:lnSpc>
@@ -4424,7 +4511,7 @@
               <a:buChar char="•"/>
             </a:pPr>
             <a:r>
-              <a:rPr b="0" lang="de-DE" sz="1950" strike="noStrike" u="none">
+              <a:rPr lang="de-DE" sz="1950" b="0" u="none" strike="noStrike">
                 <a:solidFill>
                   <a:schemeClr val="dk1"/>
                 </a:solidFill>
@@ -4434,7 +4521,7 @@
               </a:rPr>
               <a:t>Vierte Ebene</a:t>
             </a:r>
-            <a:endParaRPr b="0" lang="en-US" sz="1950" strike="noStrike" u="none">
+            <a:endParaRPr lang="en-US" sz="1950" b="0" u="none" strike="noStrike">
               <a:solidFill>
                 <a:schemeClr val="dk1"/>
               </a:solidFill>
@@ -4444,7 +4531,7 @@
             </a:endParaRPr>
           </a:p>
           <a:p>
-            <a:pPr lvl="4" marL="2228760" indent="-247680" defTabSz="990720">
+            <a:pPr marL="2228760" lvl="4" indent="-247680" defTabSz="990720">
               <a:lnSpc>
                 <a:spcPct val="90000"/>
               </a:lnSpc>
@@ -4458,7 +4545,7 @@
               <a:buChar char="•"/>
             </a:pPr>
             <a:r>
-              <a:rPr b="0" lang="de-DE" sz="1950" strike="noStrike" u="none">
+              <a:rPr lang="de-DE" sz="1950" b="0" u="none" strike="noStrike">
                 <a:solidFill>
                   <a:schemeClr val="dk1"/>
                 </a:solidFill>
@@ -4468,7 +4555,7 @@
               </a:rPr>
               <a:t>Fünfte Ebene</a:t>
             </a:r>
-            <a:endParaRPr b="0" lang="en-US" sz="1950" strike="noStrike" u="none">
+            <a:endParaRPr lang="en-US" sz="1950" b="0" u="none" strike="noStrike">
               <a:solidFill>
                 <a:schemeClr val="dk1"/>
               </a:solidFill>
@@ -4503,7 +4590,7 @@
           </a:ln>
         </p:spPr>
         <p:txBody>
-          <a:bodyPr lIns="91440" rIns="91440" tIns="45720" bIns="45720" anchor="ctr">
+          <a:bodyPr lIns="91440" tIns="45720" rIns="91440" bIns="45720" anchor="ctr">
             <a:noAutofit/>
           </a:bodyPr>
           <a:lstStyle>
@@ -4512,7 +4599,7 @@
                 <a:spcPct val="100000"/>
               </a:lnSpc>
               <a:buNone/>
-              <a:defRPr b="0" lang="de-DE" sz="1300" strike="noStrike" u="none">
+              <a:defRPr lang="de-DE" sz="1300" b="0" u="none" strike="noStrike">
                 <a:solidFill>
                   <a:schemeClr val="dk1">
                     <a:tint val="82000"/>
@@ -4532,7 +4619,7 @@
               <a:buNone/>
             </a:pPr>
             <a:r>
-              <a:rPr b="0" lang="de-DE" sz="1300" strike="noStrike" u="none">
+              <a:rPr lang="de-DE" sz="1300" b="0" u="none" strike="noStrike">
                 <a:solidFill>
                   <a:schemeClr val="dk1">
                     <a:tint val="82000"/>
@@ -4544,7 +4631,7 @@
               </a:rPr>
               <a:t>&lt;date/time&gt;</a:t>
             </a:r>
-            <a:endParaRPr b="0" lang="en-US" sz="1300" strike="noStrike" u="none">
+            <a:endParaRPr lang="en-US" sz="1300" b="0" u="none" strike="noStrike">
               <a:solidFill>
                 <a:srgbClr val="000000"/>
               </a:solidFill>
@@ -4579,13 +4666,13 @@
           </a:ln>
         </p:spPr>
         <p:txBody>
-          <a:bodyPr lIns="91440" rIns="91440" tIns="45720" bIns="45720" anchor="ctr">
+          <a:bodyPr lIns="91440" tIns="45720" rIns="91440" bIns="45720" anchor="ctr">
             <a:noAutofit/>
           </a:bodyPr>
           <a:lstStyle>
             <a:lvl1pPr indent="0" algn="ctr">
               <a:buNone/>
-              <a:defRPr b="0" lang="en-US" sz="1400" strike="noStrike" u="none">
+              <a:defRPr lang="en-US" sz="1400" b="0" u="none" strike="noStrike">
                 <a:solidFill>
                   <a:srgbClr val="000000"/>
                 </a:solidFill>
@@ -4600,7 +4687,7 @@
               <a:buNone/>
             </a:pPr>
             <a:r>
-              <a:rPr b="0" lang="en-US" sz="1400" strike="noStrike" u="none">
+              <a:rPr lang="en-US" sz="1400" b="0" u="none" strike="noStrike">
                 <a:solidFill>
                   <a:srgbClr val="000000"/>
                 </a:solidFill>
@@ -4610,14 +4697,6 @@
               </a:rPr>
               <a:t>&lt;footer&gt;</a:t>
             </a:r>
-            <a:endParaRPr b="0" lang="en-US" sz="1400" strike="noStrike" u="none">
-              <a:solidFill>
-                <a:srgbClr val="000000"/>
-              </a:solidFill>
-              <a:effectLst/>
-              <a:uFillTx/>
-              <a:latin typeface="Times New Roman"/>
-            </a:endParaRPr>
           </a:p>
         </p:txBody>
       </p:sp>
@@ -4645,7 +4724,7 @@
           </a:ln>
         </p:spPr>
         <p:txBody>
-          <a:bodyPr lIns="91440" rIns="91440" tIns="45720" bIns="45720" anchor="ctr">
+          <a:bodyPr lIns="91440" tIns="45720" rIns="91440" bIns="45720" anchor="ctr">
             <a:noAutofit/>
           </a:bodyPr>
           <a:lstStyle>
@@ -4654,7 +4733,7 @@
                 <a:spcPct val="100000"/>
               </a:lnSpc>
               <a:buNone/>
-              <a:defRPr b="0" lang="de-DE" sz="1300" strike="noStrike" u="none">
+              <a:defRPr lang="de-DE" sz="1300" b="0" u="none" strike="noStrike">
                 <a:solidFill>
                   <a:schemeClr val="dk1">
                     <a:tint val="82000"/>
@@ -4674,7 +4753,7 @@
               <a:buNone/>
             </a:pPr>
             <a:fld id="{A7EE5E07-6264-4E0A-B51F-9680F542E161}" type="slidenum">
-              <a:rPr b="0" lang="de-DE" sz="1300" strike="noStrike" u="none">
+              <a:rPr lang="de-DE" sz="1300" b="0" u="none" strike="noStrike">
                 <a:solidFill>
                   <a:schemeClr val="dk1">
                     <a:tint val="82000"/>
@@ -4684,9 +4763,9 @@
                 <a:uFillTx/>
                 <a:latin typeface="Aptos"/>
               </a:rPr>
-              <a:t>&lt;number&gt;</a:t>
+              <a:t>‹Nr.›</a:t>
             </a:fld>
-            <a:endParaRPr b="0" lang="en-US" sz="1300" strike="noStrike" u="none">
+            <a:endParaRPr lang="en-US" sz="1300" b="0" u="none" strike="noStrike">
               <a:solidFill>
                 <a:srgbClr val="000000"/>
               </a:solidFill>
@@ -4699,17 +4778,21 @@
       </p:sp>
     </p:spTree>
   </p:cSld>
+  <p:clrMapOvr>
+    <a:masterClrMapping/>
+  </p:clrMapOvr>
 </p:sldLayout>
 </file>
 
 <file path=ppt/slideLayouts/slideLayout8.xml><?xml version="1.0" encoding="utf-8"?>
-<p:sldLayout xmlns:a="http://schemas.openxmlformats.org/drawingml/2006/main" xmlns:p="http://schemas.openxmlformats.org/presentationml/2006/main" xmlns:r="http://schemas.openxmlformats.org/officeDocument/2006/relationships" xmlns:p14="http://schemas.microsoft.com/office/powerpoint/2010/main" xmlns:p15="http://schemas.microsoft.com/office/powerpoint/2012/main" xmlns:mc="http://schemas.openxmlformats.org/markup-compatibility/2006" type="titleOnly" preserve="1">
+<p:sldLayout xmlns:a="http://schemas.openxmlformats.org/drawingml/2006/main" xmlns:r="http://schemas.openxmlformats.org/officeDocument/2006/relationships" xmlns:p="http://schemas.openxmlformats.org/presentationml/2006/main" type="titleOnly" preserve="1">
   <p:cSld name="Nur Titel">
     <p:bg>
       <p:bgPr>
         <a:solidFill>
-          <a:srgbClr val="ffffff"/>
+          <a:srgbClr val="FFFFFF"/>
         </a:solidFill>
+        <a:effectLst/>
       </p:bgPr>
     </p:bg>
     <p:spTree>
@@ -4750,9 +4833,10 @@
           </a:ln>
         </p:spPr>
         <p:txBody>
-          <a:bodyPr lIns="91440" rIns="91440" tIns="45720" bIns="45720" anchor="ctr">
+          <a:bodyPr lIns="91440" tIns="45720" rIns="91440" bIns="45720" anchor="ctr">
             <a:noAutofit/>
           </a:bodyPr>
+          <a:lstStyle/>
           <a:p>
             <a:pPr indent="0" defTabSz="990720">
               <a:lnSpc>
@@ -4761,7 +4845,7 @@
               <a:buNone/>
             </a:pPr>
             <a:r>
-              <a:rPr b="0" lang="de-DE" sz="4770" strike="noStrike" u="none">
+              <a:rPr lang="de-DE" sz="4770" b="0" u="none" strike="noStrike">
                 <a:solidFill>
                   <a:schemeClr val="dk1"/>
                 </a:solidFill>
@@ -4771,7 +4855,7 @@
               </a:rPr>
               <a:t>Mastertitelformat bearbeiten</a:t>
             </a:r>
-            <a:endParaRPr b="0" lang="en-US" sz="4770" strike="noStrike" u="none">
+            <a:endParaRPr lang="en-US" sz="4770" b="0" u="none" strike="noStrike">
               <a:solidFill>
                 <a:schemeClr val="dk1"/>
               </a:solidFill>
@@ -4806,7 +4890,7 @@
           </a:ln>
         </p:spPr>
         <p:txBody>
-          <a:bodyPr lIns="91440" rIns="91440" tIns="45720" bIns="45720" anchor="ctr">
+          <a:bodyPr lIns="91440" tIns="45720" rIns="91440" bIns="45720" anchor="ctr">
             <a:noAutofit/>
           </a:bodyPr>
           <a:lstStyle>
@@ -4815,7 +4899,7 @@
                 <a:spcPct val="100000"/>
               </a:lnSpc>
               <a:buNone/>
-              <a:defRPr b="0" lang="de-DE" sz="1300" strike="noStrike" u="none">
+              <a:defRPr lang="de-DE" sz="1300" b="0" u="none" strike="noStrike">
                 <a:solidFill>
                   <a:schemeClr val="dk1">
                     <a:tint val="82000"/>
@@ -4835,7 +4919,7 @@
               <a:buNone/>
             </a:pPr>
             <a:r>
-              <a:rPr b="0" lang="de-DE" sz="1300" strike="noStrike" u="none">
+              <a:rPr lang="de-DE" sz="1300" b="0" u="none" strike="noStrike">
                 <a:solidFill>
                   <a:schemeClr val="dk1">
                     <a:tint val="82000"/>
@@ -4847,7 +4931,7 @@
               </a:rPr>
               <a:t>&lt;date/time&gt;</a:t>
             </a:r>
-            <a:endParaRPr b="0" lang="en-US" sz="1300" strike="noStrike" u="none">
+            <a:endParaRPr lang="en-US" sz="1300" b="0" u="none" strike="noStrike">
               <a:solidFill>
                 <a:srgbClr val="000000"/>
               </a:solidFill>
@@ -4882,13 +4966,13 @@
           </a:ln>
         </p:spPr>
         <p:txBody>
-          <a:bodyPr lIns="91440" rIns="91440" tIns="45720" bIns="45720" anchor="ctr">
+          <a:bodyPr lIns="91440" tIns="45720" rIns="91440" bIns="45720" anchor="ctr">
             <a:noAutofit/>
           </a:bodyPr>
           <a:lstStyle>
             <a:lvl1pPr indent="0" algn="ctr">
               <a:buNone/>
-              <a:defRPr b="0" lang="en-US" sz="1400" strike="noStrike" u="none">
+              <a:defRPr lang="en-US" sz="1400" b="0" u="none" strike="noStrike">
                 <a:solidFill>
                   <a:srgbClr val="000000"/>
                 </a:solidFill>
@@ -4903,7 +4987,7 @@
               <a:buNone/>
             </a:pPr>
             <a:r>
-              <a:rPr b="0" lang="en-US" sz="1400" strike="noStrike" u="none">
+              <a:rPr lang="en-US" sz="1400" b="0" u="none" strike="noStrike">
                 <a:solidFill>
                   <a:srgbClr val="000000"/>
                 </a:solidFill>
@@ -4913,14 +4997,6 @@
               </a:rPr>
               <a:t>&lt;footer&gt;</a:t>
             </a:r>
-            <a:endParaRPr b="0" lang="en-US" sz="1400" strike="noStrike" u="none">
-              <a:solidFill>
-                <a:srgbClr val="000000"/>
-              </a:solidFill>
-              <a:effectLst/>
-              <a:uFillTx/>
-              <a:latin typeface="Times New Roman"/>
-            </a:endParaRPr>
           </a:p>
         </p:txBody>
       </p:sp>
@@ -4948,7 +5024,7 @@
           </a:ln>
         </p:spPr>
         <p:txBody>
-          <a:bodyPr lIns="91440" rIns="91440" tIns="45720" bIns="45720" anchor="ctr">
+          <a:bodyPr lIns="91440" tIns="45720" rIns="91440" bIns="45720" anchor="ctr">
             <a:noAutofit/>
           </a:bodyPr>
           <a:lstStyle>
@@ -4957,7 +5033,7 @@
                 <a:spcPct val="100000"/>
               </a:lnSpc>
               <a:buNone/>
-              <a:defRPr b="0" lang="de-DE" sz="1300" strike="noStrike" u="none">
+              <a:defRPr lang="de-DE" sz="1300" b="0" u="none" strike="noStrike">
                 <a:solidFill>
                   <a:schemeClr val="dk1">
                     <a:tint val="82000"/>
@@ -4977,7 +5053,7 @@
               <a:buNone/>
             </a:pPr>
             <a:fld id="{9E977761-6346-4284-83CA-443C3307C9C4}" type="slidenum">
-              <a:rPr b="0" lang="de-DE" sz="1300" strike="noStrike" u="none">
+              <a:rPr lang="de-DE" sz="1300" b="0" u="none" strike="noStrike">
                 <a:solidFill>
                   <a:schemeClr val="dk1">
                     <a:tint val="82000"/>
@@ -4987,9 +5063,9 @@
                 <a:uFillTx/>
                 <a:latin typeface="Aptos"/>
               </a:rPr>
-              <a:t>&lt;number&gt;</a:t>
+              <a:t>‹Nr.›</a:t>
             </a:fld>
-            <a:endParaRPr b="0" lang="en-US" sz="1300" strike="noStrike" u="none">
+            <a:endParaRPr lang="en-US" sz="1300" b="0" u="none" strike="noStrike">
               <a:solidFill>
                 <a:srgbClr val="000000"/>
               </a:solidFill>
@@ -5002,17 +5078,21 @@
       </p:sp>
     </p:spTree>
   </p:cSld>
+  <p:clrMapOvr>
+    <a:masterClrMapping/>
+  </p:clrMapOvr>
 </p:sldLayout>
 </file>
 
 <file path=ppt/slideLayouts/slideLayout9.xml><?xml version="1.0" encoding="utf-8"?>
-<p:sldLayout xmlns:a="http://schemas.openxmlformats.org/drawingml/2006/main" xmlns:p="http://schemas.openxmlformats.org/presentationml/2006/main" xmlns:r="http://schemas.openxmlformats.org/officeDocument/2006/relationships" xmlns:p14="http://schemas.microsoft.com/office/powerpoint/2010/main" xmlns:p15="http://schemas.microsoft.com/office/powerpoint/2012/main" xmlns:mc="http://schemas.openxmlformats.org/markup-compatibility/2006" type="blank" preserve="1">
+<p:sldLayout xmlns:a="http://schemas.openxmlformats.org/drawingml/2006/main" xmlns:r="http://schemas.openxmlformats.org/officeDocument/2006/relationships" xmlns:p="http://schemas.openxmlformats.org/presentationml/2006/main" type="blank" preserve="1">
   <p:cSld name="Leer">
     <p:bg>
       <p:bgPr>
         <a:solidFill>
-          <a:srgbClr val="ffffff"/>
+          <a:srgbClr val="FFFFFF"/>
         </a:solidFill>
+        <a:effectLst/>
       </p:bgPr>
     </p:bg>
     <p:spTree>
@@ -5053,7 +5133,7 @@
           </a:ln>
         </p:spPr>
         <p:txBody>
-          <a:bodyPr lIns="91440" rIns="91440" tIns="45720" bIns="45720" anchor="ctr">
+          <a:bodyPr lIns="91440" tIns="45720" rIns="91440" bIns="45720" anchor="ctr">
             <a:noAutofit/>
           </a:bodyPr>
           <a:lstStyle>
@@ -5062,7 +5142,7 @@
                 <a:spcPct val="100000"/>
               </a:lnSpc>
               <a:buNone/>
-              <a:defRPr b="0" lang="de-DE" sz="1300" strike="noStrike" u="none">
+              <a:defRPr lang="de-DE" sz="1300" b="0" u="none" strike="noStrike">
                 <a:solidFill>
                   <a:schemeClr val="dk1">
                     <a:tint val="82000"/>
@@ -5082,7 +5162,7 @@
               <a:buNone/>
             </a:pPr>
             <a:r>
-              <a:rPr b="0" lang="de-DE" sz="1300" strike="noStrike" u="none">
+              <a:rPr lang="de-DE" sz="1300" b="0" u="none" strike="noStrike">
                 <a:solidFill>
                   <a:schemeClr val="dk1">
                     <a:tint val="82000"/>
@@ -5094,7 +5174,7 @@
               </a:rPr>
               <a:t>&lt;date/time&gt;</a:t>
             </a:r>
-            <a:endParaRPr b="0" lang="en-US" sz="1300" strike="noStrike" u="none">
+            <a:endParaRPr lang="en-US" sz="1300" b="0" u="none" strike="noStrike">
               <a:solidFill>
                 <a:srgbClr val="000000"/>
               </a:solidFill>
@@ -5129,13 +5209,13 @@
           </a:ln>
         </p:spPr>
         <p:txBody>
-          <a:bodyPr lIns="91440" rIns="91440" tIns="45720" bIns="45720" anchor="ctr">
+          <a:bodyPr lIns="91440" tIns="45720" rIns="91440" bIns="45720" anchor="ctr">
             <a:noAutofit/>
           </a:bodyPr>
           <a:lstStyle>
             <a:lvl1pPr indent="0" algn="ctr">
               <a:buNone/>
-              <a:defRPr b="0" lang="en-US" sz="1400" strike="noStrike" u="none">
+              <a:defRPr lang="en-US" sz="1400" b="0" u="none" strike="noStrike">
                 <a:solidFill>
                   <a:srgbClr val="000000"/>
                 </a:solidFill>
@@ -5150,7 +5230,7 @@
               <a:buNone/>
             </a:pPr>
             <a:r>
-              <a:rPr b="0" lang="en-US" sz="1400" strike="noStrike" u="none">
+              <a:rPr lang="en-US" sz="1400" b="0" u="none" strike="noStrike">
                 <a:solidFill>
                   <a:srgbClr val="000000"/>
                 </a:solidFill>
@@ -5160,14 +5240,6 @@
               </a:rPr>
               <a:t>&lt;footer&gt;</a:t>
             </a:r>
-            <a:endParaRPr b="0" lang="en-US" sz="1400" strike="noStrike" u="none">
-              <a:solidFill>
-                <a:srgbClr val="000000"/>
-              </a:solidFill>
-              <a:effectLst/>
-              <a:uFillTx/>
-              <a:latin typeface="Times New Roman"/>
-            </a:endParaRPr>
           </a:p>
         </p:txBody>
       </p:sp>
@@ -5195,7 +5267,7 @@
           </a:ln>
         </p:spPr>
         <p:txBody>
-          <a:bodyPr lIns="91440" rIns="91440" tIns="45720" bIns="45720" anchor="ctr">
+          <a:bodyPr lIns="91440" tIns="45720" rIns="91440" bIns="45720" anchor="ctr">
             <a:noAutofit/>
           </a:bodyPr>
           <a:lstStyle>
@@ -5204,7 +5276,7 @@
                 <a:spcPct val="100000"/>
               </a:lnSpc>
               <a:buNone/>
-              <a:defRPr b="0" lang="de-DE" sz="1300" strike="noStrike" u="none">
+              <a:defRPr lang="de-DE" sz="1300" b="0" u="none" strike="noStrike">
                 <a:solidFill>
                   <a:schemeClr val="dk1">
                     <a:tint val="82000"/>
@@ -5224,7 +5296,7 @@
               <a:buNone/>
             </a:pPr>
             <a:fld id="{7598BE80-09E5-4E77-ADB2-9B26DA4DB480}" type="slidenum">
-              <a:rPr b="0" lang="de-DE" sz="1300" strike="noStrike" u="none">
+              <a:rPr lang="de-DE" sz="1300" b="0" u="none" strike="noStrike">
                 <a:solidFill>
                   <a:schemeClr val="dk1">
                     <a:tint val="82000"/>
@@ -5234,9 +5306,9 @@
                 <a:uFillTx/>
                 <a:latin typeface="Aptos"/>
               </a:rPr>
-              <a:t>&lt;number&gt;</a:t>
+              <a:t>‹Nr.›</a:t>
             </a:fld>
-            <a:endParaRPr b="0" lang="en-US" sz="1300" strike="noStrike" u="none">
+            <a:endParaRPr lang="en-US" sz="1300" b="0" u="none" strike="noStrike">
               <a:solidFill>
                 <a:srgbClr val="000000"/>
               </a:solidFill>
@@ -5249,12 +5321,20 @@
       </p:sp>
     </p:spTree>
   </p:cSld>
+  <p:clrMapOvr>
+    <a:masterClrMapping/>
+  </p:clrMapOvr>
 </p:sldLayout>
 </file>
 
 <file path=ppt/slideMasters/slideMaster1.xml><?xml version="1.0" encoding="utf-8"?>
-<p:sldMaster xmlns:a="http://schemas.openxmlformats.org/drawingml/2006/main" xmlns:p="http://schemas.openxmlformats.org/presentationml/2006/main" xmlns:r="http://schemas.openxmlformats.org/officeDocument/2006/relationships" xmlns:p14="http://schemas.microsoft.com/office/powerpoint/2010/main" xmlns:p15="http://schemas.microsoft.com/office/powerpoint/2012/main" xmlns:mc="http://schemas.openxmlformats.org/markup-compatibility/2006">
+<p:sldMaster xmlns:a="http://schemas.openxmlformats.org/drawingml/2006/main" xmlns:r="http://schemas.openxmlformats.org/officeDocument/2006/relationships" xmlns:p="http://schemas.openxmlformats.org/presentationml/2006/main">
   <p:cSld>
+    <p:bg>
+      <p:bgRef idx="1001">
+        <a:schemeClr val="bg1"/>
+      </p:bgRef>
+    </p:bg>
     <p:spTree>
       <p:nvGrpSpPr>
         <p:cNvPr id="1" name=""/>
@@ -5273,23 +5353,303 @@
   </p:cSld>
   <p:clrMap bg1="lt1" tx1="dk1" bg2="lt2" tx2="dk2" accent1="accent1" accent2="accent2" accent3="accent3" accent4="accent4" accent5="accent5" accent6="accent6" hlink="hlink" folHlink="folHlink"/>
   <p:sldLayoutIdLst>
-    <p:sldLayoutId id="2147483649" r:id="rId2"/>
-    <p:sldLayoutId id="2147483650" r:id="rId3"/>
-    <p:sldLayoutId id="2147483651" r:id="rId4"/>
-    <p:sldLayoutId id="2147483652" r:id="rId5"/>
-    <p:sldLayoutId id="2147483653" r:id="rId6"/>
-    <p:sldLayoutId id="2147483654" r:id="rId7"/>
-    <p:sldLayoutId id="2147483655" r:id="rId8"/>
-    <p:sldLayoutId id="2147483656" r:id="rId9"/>
-    <p:sldLayoutId id="2147483657" r:id="rId10"/>
-    <p:sldLayoutId id="2147483658" r:id="rId11"/>
-    <p:sldLayoutId id="2147483659" r:id="rId12"/>
+    <p:sldLayoutId id="2147483649" r:id="rId1"/>
+    <p:sldLayoutId id="2147483650" r:id="rId2"/>
+    <p:sldLayoutId id="2147483651" r:id="rId3"/>
+    <p:sldLayoutId id="2147483652" r:id="rId4"/>
+    <p:sldLayoutId id="2147483653" r:id="rId5"/>
+    <p:sldLayoutId id="2147483654" r:id="rId6"/>
+    <p:sldLayoutId id="2147483655" r:id="rId7"/>
+    <p:sldLayoutId id="2147483656" r:id="rId8"/>
+    <p:sldLayoutId id="2147483657" r:id="rId9"/>
+    <p:sldLayoutId id="2147483658" r:id="rId10"/>
+    <p:sldLayoutId id="2147483659" r:id="rId11"/>
   </p:sldLayoutIdLst>
+  <p:txStyles>
+    <p:titleStyle>
+      <a:lvl1pPr algn="l" defTabSz="914400" rtl="0" eaLnBrk="1" latinLnBrk="0" hangingPunct="1">
+        <a:lnSpc>
+          <a:spcPct val="90000"/>
+        </a:lnSpc>
+        <a:spcBef>
+          <a:spcPct val="0"/>
+        </a:spcBef>
+        <a:buNone/>
+        <a:defRPr sz="4400" kern="1200">
+          <a:solidFill>
+            <a:schemeClr val="tx1"/>
+          </a:solidFill>
+          <a:latin typeface="+mj-lt"/>
+          <a:ea typeface="+mj-ea"/>
+          <a:cs typeface="+mj-cs"/>
+        </a:defRPr>
+      </a:lvl1pPr>
+    </p:titleStyle>
+    <p:bodyStyle>
+      <a:lvl1pPr marL="228600" indent="-228600" algn="l" defTabSz="914400" rtl="0" eaLnBrk="1" latinLnBrk="0" hangingPunct="1">
+        <a:lnSpc>
+          <a:spcPct val="90000"/>
+        </a:lnSpc>
+        <a:spcBef>
+          <a:spcPts val="1000"/>
+        </a:spcBef>
+        <a:buFont typeface="Arial" panose="020B0604020202020204" pitchFamily="34" charset="0"/>
+        <a:buChar char="•"/>
+        <a:defRPr sz="2800" kern="1200">
+          <a:solidFill>
+            <a:schemeClr val="tx1"/>
+          </a:solidFill>
+          <a:latin typeface="+mn-lt"/>
+          <a:ea typeface="+mn-ea"/>
+          <a:cs typeface="+mn-cs"/>
+        </a:defRPr>
+      </a:lvl1pPr>
+      <a:lvl2pPr marL="685800" indent="-228600" algn="l" defTabSz="914400" rtl="0" eaLnBrk="1" latinLnBrk="0" hangingPunct="1">
+        <a:lnSpc>
+          <a:spcPct val="90000"/>
+        </a:lnSpc>
+        <a:spcBef>
+          <a:spcPts val="500"/>
+        </a:spcBef>
+        <a:buFont typeface="Arial" panose="020B0604020202020204" pitchFamily="34" charset="0"/>
+        <a:buChar char="•"/>
+        <a:defRPr sz="2400" kern="1200">
+          <a:solidFill>
+            <a:schemeClr val="tx1"/>
+          </a:solidFill>
+          <a:latin typeface="+mn-lt"/>
+          <a:ea typeface="+mn-ea"/>
+          <a:cs typeface="+mn-cs"/>
+        </a:defRPr>
+      </a:lvl2pPr>
+      <a:lvl3pPr marL="1143000" indent="-228600" algn="l" defTabSz="914400" rtl="0" eaLnBrk="1" latinLnBrk="0" hangingPunct="1">
+        <a:lnSpc>
+          <a:spcPct val="90000"/>
+        </a:lnSpc>
+        <a:spcBef>
+          <a:spcPts val="500"/>
+        </a:spcBef>
+        <a:buFont typeface="Arial" panose="020B0604020202020204" pitchFamily="34" charset="0"/>
+        <a:buChar char="•"/>
+        <a:defRPr sz="2000" kern="1200">
+          <a:solidFill>
+            <a:schemeClr val="tx1"/>
+          </a:solidFill>
+          <a:latin typeface="+mn-lt"/>
+          <a:ea typeface="+mn-ea"/>
+          <a:cs typeface="+mn-cs"/>
+        </a:defRPr>
+      </a:lvl3pPr>
+      <a:lvl4pPr marL="1600200" indent="-228600" algn="l" defTabSz="914400" rtl="0" eaLnBrk="1" latinLnBrk="0" hangingPunct="1">
+        <a:lnSpc>
+          <a:spcPct val="90000"/>
+        </a:lnSpc>
+        <a:spcBef>
+          <a:spcPts val="500"/>
+        </a:spcBef>
+        <a:buFont typeface="Arial" panose="020B0604020202020204" pitchFamily="34" charset="0"/>
+        <a:buChar char="•"/>
+        <a:defRPr sz="1800" kern="1200">
+          <a:solidFill>
+            <a:schemeClr val="tx1"/>
+          </a:solidFill>
+          <a:latin typeface="+mn-lt"/>
+          <a:ea typeface="+mn-ea"/>
+          <a:cs typeface="+mn-cs"/>
+        </a:defRPr>
+      </a:lvl4pPr>
+      <a:lvl5pPr marL="2057400" indent="-228600" algn="l" defTabSz="914400" rtl="0" eaLnBrk="1" latinLnBrk="0" hangingPunct="1">
+        <a:lnSpc>
+          <a:spcPct val="90000"/>
+        </a:lnSpc>
+        <a:spcBef>
+          <a:spcPts val="500"/>
+        </a:spcBef>
+        <a:buFont typeface="Arial" panose="020B0604020202020204" pitchFamily="34" charset="0"/>
+        <a:buChar char="•"/>
+        <a:defRPr sz="1800" kern="1200">
+          <a:solidFill>
+            <a:schemeClr val="tx1"/>
+          </a:solidFill>
+          <a:latin typeface="+mn-lt"/>
+          <a:ea typeface="+mn-ea"/>
+          <a:cs typeface="+mn-cs"/>
+        </a:defRPr>
+      </a:lvl5pPr>
+      <a:lvl6pPr marL="2514600" indent="-228600" algn="l" defTabSz="914400" rtl="0" eaLnBrk="1" latinLnBrk="0" hangingPunct="1">
+        <a:lnSpc>
+          <a:spcPct val="90000"/>
+        </a:lnSpc>
+        <a:spcBef>
+          <a:spcPts val="500"/>
+        </a:spcBef>
+        <a:buFont typeface="Arial" panose="020B0604020202020204" pitchFamily="34" charset="0"/>
+        <a:buChar char="•"/>
+        <a:defRPr sz="1800" kern="1200">
+          <a:solidFill>
+            <a:schemeClr val="tx1"/>
+          </a:solidFill>
+          <a:latin typeface="+mn-lt"/>
+          <a:ea typeface="+mn-ea"/>
+          <a:cs typeface="+mn-cs"/>
+        </a:defRPr>
+      </a:lvl6pPr>
+      <a:lvl7pPr marL="2971800" indent="-228600" algn="l" defTabSz="914400" rtl="0" eaLnBrk="1" latinLnBrk="0" hangingPunct="1">
+        <a:lnSpc>
+          <a:spcPct val="90000"/>
+        </a:lnSpc>
+        <a:spcBef>
+          <a:spcPts val="500"/>
+        </a:spcBef>
+        <a:buFont typeface="Arial" panose="020B0604020202020204" pitchFamily="34" charset="0"/>
+        <a:buChar char="•"/>
+        <a:defRPr sz="1800" kern="1200">
+          <a:solidFill>
+            <a:schemeClr val="tx1"/>
+          </a:solidFill>
+          <a:latin typeface="+mn-lt"/>
+          <a:ea typeface="+mn-ea"/>
+          <a:cs typeface="+mn-cs"/>
+        </a:defRPr>
+      </a:lvl7pPr>
+      <a:lvl8pPr marL="3429000" indent="-228600" algn="l" defTabSz="914400" rtl="0" eaLnBrk="1" latinLnBrk="0" hangingPunct="1">
+        <a:lnSpc>
+          <a:spcPct val="90000"/>
+        </a:lnSpc>
+        <a:spcBef>
+          <a:spcPts val="500"/>
+        </a:spcBef>
+        <a:buFont typeface="Arial" panose="020B0604020202020204" pitchFamily="34" charset="0"/>
+        <a:buChar char="•"/>
+        <a:defRPr sz="1800" kern="1200">
+          <a:solidFill>
+            <a:schemeClr val="tx1"/>
+          </a:solidFill>
+          <a:latin typeface="+mn-lt"/>
+          <a:ea typeface="+mn-ea"/>
+          <a:cs typeface="+mn-cs"/>
+        </a:defRPr>
+      </a:lvl8pPr>
+      <a:lvl9pPr marL="3886200" indent="-228600" algn="l" defTabSz="914400" rtl="0" eaLnBrk="1" latinLnBrk="0" hangingPunct="1">
+        <a:lnSpc>
+          <a:spcPct val="90000"/>
+        </a:lnSpc>
+        <a:spcBef>
+          <a:spcPts val="500"/>
+        </a:spcBef>
+        <a:buFont typeface="Arial" panose="020B0604020202020204" pitchFamily="34" charset="0"/>
+        <a:buChar char="•"/>
+        <a:defRPr sz="1800" kern="1200">
+          <a:solidFill>
+            <a:schemeClr val="tx1"/>
+          </a:solidFill>
+          <a:latin typeface="+mn-lt"/>
+          <a:ea typeface="+mn-ea"/>
+          <a:cs typeface="+mn-cs"/>
+        </a:defRPr>
+      </a:lvl9pPr>
+    </p:bodyStyle>
+    <p:otherStyle>
+      <a:defPPr>
+        <a:defRPr lang="de-DE"/>
+      </a:defPPr>
+      <a:lvl1pPr marL="0" algn="l" defTabSz="914400" rtl="0" eaLnBrk="1" latinLnBrk="0" hangingPunct="1">
+        <a:defRPr sz="1800" kern="1200">
+          <a:solidFill>
+            <a:schemeClr val="tx1"/>
+          </a:solidFill>
+          <a:latin typeface="+mn-lt"/>
+          <a:ea typeface="+mn-ea"/>
+          <a:cs typeface="+mn-cs"/>
+        </a:defRPr>
+      </a:lvl1pPr>
+      <a:lvl2pPr marL="457200" algn="l" defTabSz="914400" rtl="0" eaLnBrk="1" latinLnBrk="0" hangingPunct="1">
+        <a:defRPr sz="1800" kern="1200">
+          <a:solidFill>
+            <a:schemeClr val="tx1"/>
+          </a:solidFill>
+          <a:latin typeface="+mn-lt"/>
+          <a:ea typeface="+mn-ea"/>
+          <a:cs typeface="+mn-cs"/>
+        </a:defRPr>
+      </a:lvl2pPr>
+      <a:lvl3pPr marL="914400" algn="l" defTabSz="914400" rtl="0" eaLnBrk="1" latinLnBrk="0" hangingPunct="1">
+        <a:defRPr sz="1800" kern="1200">
+          <a:solidFill>
+            <a:schemeClr val="tx1"/>
+          </a:solidFill>
+          <a:latin typeface="+mn-lt"/>
+          <a:ea typeface="+mn-ea"/>
+          <a:cs typeface="+mn-cs"/>
+        </a:defRPr>
+      </a:lvl3pPr>
+      <a:lvl4pPr marL="1371600" algn="l" defTabSz="914400" rtl="0" eaLnBrk="1" latinLnBrk="0" hangingPunct="1">
+        <a:defRPr sz="1800" kern="1200">
+          <a:solidFill>
+            <a:schemeClr val="tx1"/>
+          </a:solidFill>
+          <a:latin typeface="+mn-lt"/>
+          <a:ea typeface="+mn-ea"/>
+          <a:cs typeface="+mn-cs"/>
+        </a:defRPr>
+      </a:lvl4pPr>
+      <a:lvl5pPr marL="1828800" algn="l" defTabSz="914400" rtl="0" eaLnBrk="1" latinLnBrk="0" hangingPunct="1">
+        <a:defRPr sz="1800" kern="1200">
+          <a:solidFill>
+            <a:schemeClr val="tx1"/>
+          </a:solidFill>
+          <a:latin typeface="+mn-lt"/>
+          <a:ea typeface="+mn-ea"/>
+          <a:cs typeface="+mn-cs"/>
+        </a:defRPr>
+      </a:lvl5pPr>
+      <a:lvl6pPr marL="2286000" algn="l" defTabSz="914400" rtl="0" eaLnBrk="1" latinLnBrk="0" hangingPunct="1">
+        <a:defRPr sz="1800" kern="1200">
+          <a:solidFill>
+            <a:schemeClr val="tx1"/>
+          </a:solidFill>
+          <a:latin typeface="+mn-lt"/>
+          <a:ea typeface="+mn-ea"/>
+          <a:cs typeface="+mn-cs"/>
+        </a:defRPr>
+      </a:lvl6pPr>
+      <a:lvl7pPr marL="2743200" algn="l" defTabSz="914400" rtl="0" eaLnBrk="1" latinLnBrk="0" hangingPunct="1">
+        <a:defRPr sz="1800" kern="1200">
+          <a:solidFill>
+            <a:schemeClr val="tx1"/>
+          </a:solidFill>
+          <a:latin typeface="+mn-lt"/>
+          <a:ea typeface="+mn-ea"/>
+          <a:cs typeface="+mn-cs"/>
+        </a:defRPr>
+      </a:lvl7pPr>
+      <a:lvl8pPr marL="3200400" algn="l" defTabSz="914400" rtl="0" eaLnBrk="1" latinLnBrk="0" hangingPunct="1">
+        <a:defRPr sz="1800" kern="1200">
+          <a:solidFill>
+            <a:schemeClr val="tx1"/>
+          </a:solidFill>
+          <a:latin typeface="+mn-lt"/>
+          <a:ea typeface="+mn-ea"/>
+          <a:cs typeface="+mn-cs"/>
+        </a:defRPr>
+      </a:lvl8pPr>
+      <a:lvl9pPr marL="3657600" algn="l" defTabSz="914400" rtl="0" eaLnBrk="1" latinLnBrk="0" hangingPunct="1">
+        <a:defRPr sz="1800" kern="1200">
+          <a:solidFill>
+            <a:schemeClr val="tx1"/>
+          </a:solidFill>
+          <a:latin typeface="+mn-lt"/>
+          <a:ea typeface="+mn-ea"/>
+          <a:cs typeface="+mn-cs"/>
+        </a:defRPr>
+      </a:lvl9pPr>
+    </p:otherStyle>
+  </p:txStyles>
 </p:sldMaster>
 </file>
 
 <file path=ppt/slides/slide1.xml><?xml version="1.0" encoding="utf-8"?>
-<p:sld xmlns:a="http://schemas.openxmlformats.org/drawingml/2006/main" xmlns:p="http://schemas.openxmlformats.org/presentationml/2006/main" xmlns:r="http://schemas.openxmlformats.org/officeDocument/2006/relationships" xmlns:p14="http://schemas.microsoft.com/office/powerpoint/2010/main" xmlns:p15="http://schemas.microsoft.com/office/powerpoint/2012/main" xmlns:mc="http://schemas.openxmlformats.org/markup-compatibility/2006">
+<p:sld xmlns:a="http://schemas.openxmlformats.org/drawingml/2006/main" xmlns:r="http://schemas.openxmlformats.org/officeDocument/2006/relationships" xmlns:p="http://schemas.openxmlformats.org/presentationml/2006/main">
   <p:cSld>
     <p:spTree>
       <p:nvGrpSpPr>
@@ -5343,16 +5703,17 @@
           <a:fontRef idx="minor"/>
         </p:style>
         <p:txBody>
-          <a:bodyPr lIns="90000" rIns="90000" tIns="45000" bIns="45000" anchor="ctr">
+          <a:bodyPr lIns="90000" tIns="45000" rIns="90000" bIns="45000" anchor="ctr">
             <a:noAutofit/>
           </a:bodyPr>
+          <a:lstStyle/>
           <a:p>
             <a:pPr algn="ctr" defTabSz="457200">
               <a:lnSpc>
                 <a:spcPct val="100000"/>
               </a:lnSpc>
             </a:pPr>
-            <a:endParaRPr b="0" lang="de-DE" sz="1800" strike="noStrike" u="none">
+            <a:endParaRPr lang="de-DE" sz="1800" b="0" u="none" strike="noStrike">
               <a:solidFill>
                 <a:schemeClr val="lt1"/>
               </a:solidFill>
@@ -5401,16 +5762,17 @@
           <a:fontRef idx="minor"/>
         </p:style>
         <p:txBody>
-          <a:bodyPr lIns="90000" rIns="90000" tIns="45000" bIns="45000" anchor="ctr">
+          <a:bodyPr lIns="90000" tIns="45000" rIns="90000" bIns="45000" anchor="ctr">
             <a:noAutofit/>
           </a:bodyPr>
+          <a:lstStyle/>
           <a:p>
             <a:pPr algn="ctr" defTabSz="457200">
               <a:lnSpc>
                 <a:spcPct val="100000"/>
               </a:lnSpc>
             </a:pPr>
-            <a:endParaRPr b="0" lang="de-DE" sz="1800" strike="noStrike" u="none">
+            <a:endParaRPr lang="de-DE" sz="1800" b="0" u="none" strike="noStrike">
               <a:solidFill>
                 <a:schemeClr val="lt1"/>
               </a:solidFill>
@@ -5423,27 +5785,29 @@
       </p:sp>
       <p:sp>
         <p:nvSpPr>
-          <p:cNvPr id="59" name="Kreuz 5"/>
+          <p:cNvPr id="2" name="Ellipse 1">
+            <a:extLst>
+              <a:ext uri="{FF2B5EF4-FFF2-40B4-BE49-F238E27FC236}">
+                <a16:creationId xmlns:a16="http://schemas.microsoft.com/office/drawing/2014/main" id="{48C1A175-6617-6159-5B3A-C4B2160E141B}"/>
+              </a:ext>
+            </a:extLst>
+          </p:cNvPr>
           <p:cNvSpPr/>
           <p:nvPr/>
         </p:nvSpPr>
         <p:spPr>
-          <a:xfrm rot="18910800">
-            <a:off x="3868920" y="-87840"/>
-            <a:ext cx="2181240" cy="2167920"/>
+          <a:xfrm>
+            <a:off x="4871217" y="-92877"/>
+            <a:ext cx="180000" cy="180000"/>
           </a:xfrm>
-          <a:prstGeom prst="plus">
-            <a:avLst>
-              <a:gd name="adj" fmla="val 47112"/>
-            </a:avLst>
+          <a:prstGeom prst="ellipse">
+            <a:avLst/>
           </a:prstGeom>
           <a:solidFill>
-            <a:srgbClr val="c00000"/>
+            <a:srgbClr val="C00000"/>
           </a:solidFill>
           <a:ln>
-            <a:solidFill>
-              <a:srgbClr val="c00000"/>
-            </a:solidFill>
+            <a:noFill/>
           </a:ln>
         </p:spPr>
         <p:style>
@@ -5458,91 +5822,76 @@
           <a:effectRef idx="0">
             <a:schemeClr val="accent1"/>
           </a:effectRef>
-          <a:fontRef idx="minor"/>
+          <a:fontRef idx="minor">
+            <a:schemeClr val="lt1"/>
+          </a:fontRef>
         </p:style>
         <p:txBody>
-          <a:bodyPr lIns="90000" rIns="90000" tIns="45000" bIns="45000" anchor="ctr">
-            <a:noAutofit/>
-          </a:bodyPr>
-          <a:p>
-            <a:pPr algn="ctr" defTabSz="457200">
-              <a:lnSpc>
-                <a:spcPct val="100000"/>
-              </a:lnSpc>
-            </a:pPr>
-            <a:endParaRPr b="0" lang="de-DE" sz="1800" strike="noStrike" u="none">
-              <a:solidFill>
-                <a:schemeClr val="lt1"/>
-              </a:solidFill>
-              <a:effectLst/>
-              <a:uFillTx/>
-              <a:latin typeface="Aptos"/>
-            </a:endParaRPr>
+          <a:bodyPr rtlCol="0" anchor="ctr"/>
+          <a:lstStyle/>
+          <a:p>
+            <a:pPr algn="ctr"/>
+            <a:endParaRPr lang="de-DE"/>
           </a:p>
         </p:txBody>
       </p:sp>
     </p:spTree>
   </p:cSld>
-  <mc:AlternateContent>
-    <mc:Choice Requires="p14">
-      <p:transition spd="slow" p14:dur="2000"/>
-    </mc:Choice>
-    <mc:Fallback>
-      <p:transition spd="slow"/>
-    </mc:Fallback>
-  </mc:AlternateContent>
+  <p:clrMapOvr>
+    <a:masterClrMapping/>
+  </p:clrMapOvr>
 </p:sld>
 </file>
 
 <file path=ppt/theme/theme1.xml><?xml version="1.0" encoding="utf-8"?>
-<a:theme xmlns:a="http://schemas.openxmlformats.org/drawingml/2006/main" xmlns:r="http://schemas.openxmlformats.org/officeDocument/2006/relationships" name="Office">
+<a:theme xmlns:a="http://schemas.openxmlformats.org/drawingml/2006/main" name="Office">
   <a:themeElements>
     <a:clrScheme name="Office">
       <a:dk1>
         <a:srgbClr val="000000"/>
       </a:dk1>
       <a:lt1>
-        <a:srgbClr val="ffffff"/>
+        <a:srgbClr val="FFFFFF"/>
       </a:lt1>
       <a:dk2>
-        <a:srgbClr val="0e2841"/>
+        <a:srgbClr val="0E2841"/>
       </a:dk2>
       <a:lt2>
-        <a:srgbClr val="e8e8e8"/>
+        <a:srgbClr val="E8E8E8"/>
       </a:lt2>
       <a:accent1>
         <a:srgbClr val="156082"/>
       </a:accent1>
       <a:accent2>
-        <a:srgbClr val="e97132"/>
+        <a:srgbClr val="E97132"/>
       </a:accent2>
       <a:accent3>
-        <a:srgbClr val="196b24"/>
+        <a:srgbClr val="196B24"/>
       </a:accent3>
       <a:accent4>
-        <a:srgbClr val="0f9ed5"/>
+        <a:srgbClr val="0F9ED5"/>
       </a:accent4>
       <a:accent5>
-        <a:srgbClr val="a02b93"/>
+        <a:srgbClr val="A02B93"/>
       </a:accent5>
       <a:accent6>
-        <a:srgbClr val="4ea72e"/>
+        <a:srgbClr val="4EA72E"/>
       </a:accent6>
       <a:hlink>
         <a:srgbClr val="467886"/>
       </a:hlink>
       <a:folHlink>
-        <a:srgbClr val="96607d"/>
+        <a:srgbClr val="96607D"/>
       </a:folHlink>
     </a:clrScheme>
     <a:fontScheme name="Office">
       <a:majorFont>
-        <a:latin typeface="Aptos Display" panose="02110004020202020204" pitchFamily="0" charset="1"/>
+        <a:latin typeface="Aptos Display" panose="02110004020202020204"/>
         <a:ea typeface=""/>
         <a:cs typeface=""/>
       </a:majorFont>
       <a:minorFont>
-        <a:latin typeface="Aptos" panose="02110004020202020204" pitchFamily="0" charset="1"/>
+        <a:latin typeface="Aptos" panose="02110004020202020204"/>
         <a:ea typeface=""/>
         <a:cs typeface=""/>
       </a:minorFont>
@@ -5574,7 +5923,7 @@
             </a:gs>
           </a:gsLst>
           <a:lin ang="5400000" scaled="0"/>
-          <a:tileRect l="0" t="0" r="0" b="0"/>
+          <a:tileRect/>
         </a:gradFill>
         <a:gradFill>
           <a:gsLst>
@@ -5598,7 +5947,7 @@
             </a:gs>
           </a:gsLst>
           <a:lin ang="5400000" scaled="0"/>
-          <a:tileRect l="0" t="0" r="0" b="0"/>
+          <a:tileRect/>
         </a:gradFill>
       </a:fillStyleLst>
       <a:lnStyleLst>
@@ -5658,10 +6007,12 @@
             </a:gs>
           </a:gsLst>
           <a:lin ang="5400000" scaled="0"/>
-          <a:tileRect l="0" t="0" r="0" b="0"/>
+          <a:tileRect/>
         </a:gradFill>
       </a:bgFillStyleLst>
     </a:fmtScheme>
   </a:themeElements>
+  <a:objectDefaults/>
+  <a:extraClrSchemeLst/>
 </a:theme>
 </file>
</xml_diff>